<commit_message>
work on presentation, almost done
</commit_message>
<xml_diff>
--- a/Presentation/presentation_AymanMahmoud.pptx
+++ b/Presentation/presentation_AymanMahmoud.pptx
@@ -5,10 +5,10 @@
     <p:sldMasterId id="2147483648" r:id="rId1"/>
   </p:sldMasterIdLst>
   <p:notesMasterIdLst>
-    <p:notesMasterId r:id="rId35"/>
+    <p:notesMasterId r:id="rId34"/>
   </p:notesMasterIdLst>
   <p:handoutMasterIdLst>
-    <p:handoutMasterId r:id="rId36"/>
+    <p:handoutMasterId r:id="rId35"/>
   </p:handoutMasterIdLst>
   <p:sldIdLst>
     <p:sldId id="256" r:id="rId2"/>
@@ -39,11 +39,10 @@
     <p:sldId id="304" r:id="rId27"/>
     <p:sldId id="305" r:id="rId28"/>
     <p:sldId id="266" r:id="rId29"/>
-    <p:sldId id="279" r:id="rId30"/>
-    <p:sldId id="295" r:id="rId31"/>
-    <p:sldId id="274" r:id="rId32"/>
-    <p:sldId id="267" r:id="rId33"/>
-    <p:sldId id="269" r:id="rId34"/>
+    <p:sldId id="295" r:id="rId30"/>
+    <p:sldId id="274" r:id="rId31"/>
+    <p:sldId id="267" r:id="rId32"/>
+    <p:sldId id="269" r:id="rId33"/>
   </p:sldIdLst>
   <p:sldSz cx="12192000" cy="6858000"/>
   <p:notesSz cx="6858000" cy="9144000"/>
@@ -232,7 +231,7 @@
           <a:p>
             <a:fld id="{1547E6EB-1EAE-48E4-BCE0-B32F6201B4F1}" type="datetimeFigureOut">
               <a:rPr lang="fr-FR" smtClean="0"/>
-              <a:t>11/06/2020</a:t>
+              <a:t>12/06/2020</a:t>
             </a:fld>
             <a:endParaRPr lang="fr-FR"/>
           </a:p>
@@ -398,7 +397,7 @@
           <a:p>
             <a:fld id="{9043A989-57D6-4AA9-8895-197399A65B64}" type="datetimeFigureOut">
               <a:rPr lang="fr-FR" smtClean="0"/>
-              <a:t>11/06/2020</a:t>
+              <a:t>12/06/2020</a:t>
             </a:fld>
             <a:endParaRPr lang="fr-FR"/>
           </a:p>
@@ -1038,7 +1037,7 @@
           <a:p>
             <a:fld id="{EC0460D8-7D6C-45FC-80B0-C70977082B83}" type="datetime1">
               <a:rPr lang="fr-FR" smtClean="0"/>
-              <a:t>11/06/2020</a:t>
+              <a:t>12/06/2020</a:t>
             </a:fld>
             <a:endParaRPr lang="fr-FR"/>
           </a:p>
@@ -1212,7 +1211,7 @@
           <a:p>
             <a:fld id="{7B062BF9-7D44-44EE-98A7-6610A80C409D}" type="datetime1">
               <a:rPr lang="fr-FR" smtClean="0"/>
-              <a:t>11/06/2020</a:t>
+              <a:t>12/06/2020</a:t>
             </a:fld>
             <a:endParaRPr lang="fr-FR"/>
           </a:p>
@@ -1396,7 +1395,7 @@
           <a:p>
             <a:fld id="{18F56096-A4A8-4376-B1AB-C5110AF9D604}" type="datetime1">
               <a:rPr lang="fr-FR" smtClean="0"/>
-              <a:t>11/06/2020</a:t>
+              <a:t>12/06/2020</a:t>
             </a:fld>
             <a:endParaRPr lang="fr-FR"/>
           </a:p>
@@ -1570,7 +1569,7 @@
           <a:p>
             <a:fld id="{F17915BF-AA20-4B83-BAD9-5FAEB744B471}" type="datetime1">
               <a:rPr lang="fr-FR" smtClean="0"/>
-              <a:t>11/06/2020</a:t>
+              <a:t>12/06/2020</a:t>
             </a:fld>
             <a:endParaRPr lang="fr-FR"/>
           </a:p>
@@ -1820,7 +1819,7 @@
           <a:p>
             <a:fld id="{EC0D4205-83A0-43E0-A4C6-39E225F51999}" type="datetime1">
               <a:rPr lang="fr-FR" smtClean="0"/>
-              <a:t>11/06/2020</a:t>
+              <a:t>12/06/2020</a:t>
             </a:fld>
             <a:endParaRPr lang="fr-FR"/>
           </a:p>
@@ -2056,7 +2055,7 @@
           <a:p>
             <a:fld id="{2F1AF2AD-2BEB-4321-8782-452CBE8237CC}" type="datetime1">
               <a:rPr lang="fr-FR" smtClean="0"/>
-              <a:t>11/06/2020</a:t>
+              <a:t>12/06/2020</a:t>
             </a:fld>
             <a:endParaRPr lang="fr-FR"/>
           </a:p>
@@ -2427,7 +2426,7 @@
           <a:p>
             <a:fld id="{8394D177-B44C-4E86-BC0F-9F32A6F05AF4}" type="datetime1">
               <a:rPr lang="fr-FR" smtClean="0"/>
-              <a:t>11/06/2020</a:t>
+              <a:t>12/06/2020</a:t>
             </a:fld>
             <a:endParaRPr lang="fr-FR"/>
           </a:p>
@@ -2549,7 +2548,7 @@
           <a:p>
             <a:fld id="{5201259E-6734-49DF-9294-C44135CAA86F}" type="datetime1">
               <a:rPr lang="fr-FR" smtClean="0"/>
-              <a:t>11/06/2020</a:t>
+              <a:t>12/06/2020</a:t>
             </a:fld>
             <a:endParaRPr lang="fr-FR"/>
           </a:p>
@@ -2648,7 +2647,7 @@
           <a:p>
             <a:fld id="{AE26457A-09FA-4F64-BCAF-1B579227CCBF}" type="datetime1">
               <a:rPr lang="fr-FR" smtClean="0"/>
-              <a:t>11/06/2020</a:t>
+              <a:t>12/06/2020</a:t>
             </a:fld>
             <a:endParaRPr lang="fr-FR"/>
           </a:p>
@@ -2929,7 +2928,7 @@
           <a:p>
             <a:fld id="{A64082FC-FC91-4EBC-9C42-F1F474C9AB80}" type="datetime1">
               <a:rPr lang="fr-FR" smtClean="0"/>
-              <a:t>11/06/2020</a:t>
+              <a:t>12/06/2020</a:t>
             </a:fld>
             <a:endParaRPr lang="fr-FR"/>
           </a:p>
@@ -3186,7 +3185,7 @@
           <a:p>
             <a:fld id="{60AE6024-B06A-43A0-805A-5A366FDB9245}" type="datetime1">
               <a:rPr lang="fr-FR" smtClean="0"/>
-              <a:t>11/06/2020</a:t>
+              <a:t>12/06/2020</a:t>
             </a:fld>
             <a:endParaRPr lang="fr-FR"/>
           </a:p>
@@ -3403,7 +3402,7 @@
           <a:p>
             <a:fld id="{3535E984-AE03-4616-B729-789F7B6F9A3E}" type="datetime1">
               <a:rPr lang="fr-FR" smtClean="0"/>
-              <a:t>11/06/2020</a:t>
+              <a:t>12/06/2020</a:t>
             </a:fld>
             <a:endParaRPr lang="fr-FR"/>
           </a:p>
@@ -4164,7 +4163,7 @@
           <a:p>
             <a:fld id="{6A876909-4EFA-44E5-B204-708CA0B0CC1C}" type="datetime1">
               <a:rPr lang="fr-FR" smtClean="0"/>
-              <a:t>11/06/2020</a:t>
+              <a:t>12/06/2020</a:t>
             </a:fld>
             <a:endParaRPr lang="fr-FR"/>
           </a:p>
@@ -4985,7 +4984,7 @@
           <a:p>
             <a:fld id="{F17915BF-AA20-4B83-BAD9-5FAEB744B471}" type="datetime1">
               <a:rPr lang="fr-FR" smtClean="0"/>
-              <a:t>11/06/2020</a:t>
+              <a:t>12/06/2020</a:t>
             </a:fld>
             <a:endParaRPr lang="fr-FR"/>
           </a:p>
@@ -5680,7 +5679,7 @@
           <a:p>
             <a:fld id="{F17915BF-AA20-4B83-BAD9-5FAEB744B471}" type="datetime1">
               <a:rPr lang="fr-FR" smtClean="0"/>
-              <a:t>11/06/2020</a:t>
+              <a:t>12/06/2020</a:t>
             </a:fld>
             <a:endParaRPr lang="fr-FR"/>
           </a:p>
@@ -5823,7 +5822,15 @@
           <a:p>
             <a:r>
               <a:rPr lang="en-US" dirty="0"/>
-              <a:t>Inter-modality and multimodality exist in </a:t>
+              <a:t>Inter-modality and multimodality </a:t>
+            </a:r>
+            <a:r>
+              <a:rPr lang="en-US" dirty="0" smtClean="0"/>
+              <a:t>exists </a:t>
+            </a:r>
+            <a:r>
+              <a:rPr lang="en-US" dirty="0"/>
+              <a:t>in </a:t>
             </a:r>
             <a:r>
               <a:rPr lang="en-US" dirty="0" smtClean="0"/>
@@ -6264,7 +6271,15 @@
           <a:p>
             <a:r>
               <a:rPr lang="fr-FR" dirty="0" smtClean="0"/>
-              <a:t>The gap </a:t>
+              <a:t>The </a:t>
+            </a:r>
+            <a:r>
+              <a:rPr lang="fr-FR" dirty="0" err="1" smtClean="0"/>
+              <a:t>research</a:t>
+            </a:r>
+            <a:r>
+              <a:rPr lang="fr-FR" dirty="0" smtClean="0"/>
+              <a:t> gap </a:t>
             </a:r>
             <a:r>
               <a:rPr lang="fr-FR" dirty="0" err="1" smtClean="0"/>
@@ -6288,8 +6303,21 @@
           <a:p>
             <a:r>
               <a:rPr lang="en-US" dirty="0" smtClean="0"/>
-              <a:t>Research assessment: Stagnant.</a:t>
-            </a:r>
+              <a:t>Research assessment: </a:t>
+            </a:r>
+            <a:r>
+              <a:rPr lang="en-US" b="1" dirty="0" smtClean="0">
+                <a:solidFill>
+                  <a:srgbClr val="FF0000"/>
+                </a:solidFill>
+              </a:rPr>
+              <a:t>Slow</a:t>
+            </a:r>
+            <a:r>
+              <a:rPr lang="en-US" dirty="0" smtClean="0"/>
+              <a:t>.</a:t>
+            </a:r>
+            <a:endParaRPr lang="en-US" dirty="0" smtClean="0"/>
           </a:p>
           <a:p>
             <a:r>
@@ -6656,7 +6684,7 @@
           <a:p>
             <a:fld id="{E39C0432-D099-4AE5-8A72-A92771CC39A0}" type="datetime1">
               <a:rPr lang="fr-FR" smtClean="0"/>
-              <a:t>11/06/2020</a:t>
+              <a:t>12/06/2020</a:t>
             </a:fld>
             <a:endParaRPr lang="fr-FR"/>
           </a:p>
@@ -7235,7 +7263,7 @@
           <a:p>
             <a:fld id="{81DC2260-F0FB-47E0-80FC-B07DA79F672F}" type="datetime1">
               <a:rPr lang="fr-FR" smtClean="0"/>
-              <a:t>11/06/2020</a:t>
+              <a:t>12/06/2020</a:t>
             </a:fld>
             <a:endParaRPr lang="fr-FR"/>
           </a:p>
@@ -7429,7 +7457,7 @@
           <a:p>
             <a:fld id="{801EEE06-387C-4EF9-A2D7-AA9BEBC30A41}" type="datetime1">
               <a:rPr lang="fr-FR" smtClean="0"/>
-              <a:t>11/06/2020</a:t>
+              <a:t>12/06/2020</a:t>
             </a:fld>
             <a:endParaRPr lang="fr-FR"/>
           </a:p>
@@ -7594,7 +7622,7 @@
           <a:p>
             <a:fld id="{2AD4B7A5-8E41-4B3D-927B-B7CA3754DCB6}" type="datetime1">
               <a:rPr lang="fr-FR" smtClean="0"/>
-              <a:t>11/06/2020</a:t>
+              <a:t>12/06/2020</a:t>
             </a:fld>
             <a:endParaRPr lang="fr-FR"/>
           </a:p>
@@ -7859,7 +7887,7 @@
           <a:p>
             <a:fld id="{5BD405C5-38C8-4E11-8447-7AD5F7FEB0C7}" type="datetime1">
               <a:rPr lang="fr-FR" smtClean="0"/>
-              <a:t>11/06/2020</a:t>
+              <a:t>12/06/2020</a:t>
             </a:fld>
             <a:endParaRPr lang="fr-FR"/>
           </a:p>
@@ -8025,7 +8053,7 @@
           <a:p>
             <a:fld id="{7441A4E0-7AEB-4D77-BFAF-1F41CB1039BE}" type="datetime1">
               <a:rPr lang="fr-FR" smtClean="0"/>
-              <a:t>11/06/2020</a:t>
+              <a:t>12/06/2020</a:t>
             </a:fld>
             <a:endParaRPr lang="fr-FR"/>
           </a:p>
@@ -8630,11 +8658,7 @@
             </a:r>
             <a:r>
               <a:rPr lang="fr-FR" dirty="0" smtClean="0"/>
-              <a:t> </a:t>
-            </a:r>
-            <a:r>
-              <a:rPr lang="fr-FR" dirty="0" smtClean="0"/>
-              <a:t>of </a:t>
+              <a:t> of </a:t>
             </a:r>
             <a:r>
               <a:rPr lang="fr-FR" dirty="0" err="1" smtClean="0"/>
@@ -8665,11 +8689,7 @@
             </a:r>
             <a:r>
               <a:rPr lang="fr-FR" dirty="0" smtClean="0"/>
-              <a:t> </a:t>
-            </a:r>
-            <a:r>
-              <a:rPr lang="fr-FR" dirty="0" smtClean="0"/>
-              <a:t>of stations</a:t>
+              <a:t> of stations</a:t>
             </a:r>
           </a:p>
           <a:p>
@@ -8713,11 +8733,6 @@
               </a:rPr>
               <a:t>j</a:t>
             </a:r>
-            <a:endParaRPr lang="fr-FR" dirty="0" smtClean="0">
-              <a:solidFill>
-                <a:srgbClr val="FF0000"/>
-              </a:solidFill>
-            </a:endParaRPr>
           </a:p>
           <a:p>
             <a:r>
@@ -9123,7 +9138,7 @@
           <a:p>
             <a:fld id="{79353721-B2C7-4EEA-801F-4522D2089674}" type="datetime1">
               <a:rPr lang="fr-FR" smtClean="0"/>
-              <a:t>11/06/2020</a:t>
+              <a:t>12/06/2020</a:t>
             </a:fld>
             <a:endParaRPr lang="fr-FR"/>
           </a:p>
@@ -9256,11 +9271,7 @@
             </a:r>
             <a:r>
               <a:rPr lang="fr-FR" dirty="0" smtClean="0"/>
-              <a:t> </a:t>
-            </a:r>
-            <a:r>
-              <a:rPr lang="fr-FR" dirty="0" smtClean="0"/>
-              <a:t>of pickups, </a:t>
+              <a:t> of pickups, </a:t>
             </a:r>
             <a:r>
               <a:rPr lang="fr-FR" dirty="0" err="1" smtClean="0"/>
@@ -9940,11 +9951,7 @@
           <a:p>
             <a:r>
               <a:rPr lang="fr-FR" b="1" dirty="0" smtClean="0"/>
-              <a:t>Structure &amp; </a:t>
-            </a:r>
-            <a:r>
-              <a:rPr lang="fr-FR" b="1" dirty="0" smtClean="0"/>
-              <a:t>flow:</a:t>
+              <a:t>Structure &amp; flow:</a:t>
             </a:r>
             <a:endParaRPr lang="fr-FR" b="1" dirty="0"/>
           </a:p>
@@ -10058,7 +10065,7 @@
           <a:p>
             <a:fld id="{F17915BF-AA20-4B83-BAD9-5FAEB744B471}" type="datetime1">
               <a:rPr lang="fr-FR" smtClean="0"/>
-              <a:t>11/06/2020</a:t>
+              <a:t>12/06/2020</a:t>
             </a:fld>
             <a:endParaRPr lang="fr-FR"/>
           </a:p>
@@ -10596,7 +10603,7 @@
           <a:p>
             <a:fld id="{F17915BF-AA20-4B83-BAD9-5FAEB744B471}" type="datetime1">
               <a:rPr lang="fr-FR" smtClean="0"/>
-              <a:t>11/06/2020</a:t>
+              <a:t>12/06/2020</a:t>
             </a:fld>
             <a:endParaRPr lang="fr-FR"/>
           </a:p>
@@ -10837,7 +10844,7 @@
           <a:p>
             <a:fld id="{F17915BF-AA20-4B83-BAD9-5FAEB744B471}" type="datetime1">
               <a:rPr lang="fr-FR" smtClean="0"/>
-              <a:t>11/06/2020</a:t>
+              <a:t>12/06/2020</a:t>
             </a:fld>
             <a:endParaRPr lang="fr-FR"/>
           </a:p>
@@ -10949,6 +10956,81 @@
           </a:prstGeom>
         </p:spPr>
       </p:pic>
+      <p:sp>
+        <p:nvSpPr>
+          <p:cNvPr id="2" name="ZoneTexte 1"/>
+          <p:cNvSpPr txBox="1"/>
+          <p:nvPr/>
+        </p:nvSpPr>
+        <p:spPr>
+          <a:xfrm>
+            <a:off x="2277829" y="5027599"/>
+            <a:ext cx="1792478" cy="830997"/>
+          </a:xfrm>
+          <a:prstGeom prst="rect">
+            <a:avLst/>
+          </a:prstGeom>
+          <a:noFill/>
+        </p:spPr>
+        <p:txBody>
+          <a:bodyPr wrap="none" rtlCol="0">
+            <a:spAutoFit/>
+          </a:bodyPr>
+          <a:lstStyle/>
+          <a:p>
+            <a:r>
+              <a:rPr lang="fr-FR" sz="2400" b="1" dirty="0" smtClean="0"/>
+              <a:t>25 </a:t>
+            </a:r>
+            <a:r>
+              <a:rPr lang="fr-FR" sz="2400" b="1" dirty="0" err="1" smtClean="0"/>
+              <a:t>Bookings</a:t>
+            </a:r>
+            <a:endParaRPr lang="fr-FR" sz="2400" b="1" dirty="0" smtClean="0"/>
+          </a:p>
+          <a:p>
+            <a:r>
+              <a:rPr lang="fr-FR" sz="2400" b="1" dirty="0" smtClean="0"/>
+              <a:t>10 </a:t>
+            </a:r>
+            <a:r>
+              <a:rPr lang="fr-FR" sz="2400" b="1" dirty="0" err="1" smtClean="0"/>
+              <a:t>Timeslots</a:t>
+            </a:r>
+            <a:endParaRPr lang="fr-FR" sz="2400" b="1" dirty="0"/>
+          </a:p>
+        </p:txBody>
+      </p:sp>
+      <p:sp>
+        <p:nvSpPr>
+          <p:cNvPr id="10" name="ZoneTexte 9"/>
+          <p:cNvSpPr txBox="1"/>
+          <p:nvPr/>
+        </p:nvSpPr>
+        <p:spPr>
+          <a:xfrm>
+            <a:off x="7762651" y="5027599"/>
+            <a:ext cx="2510559" cy="461665"/>
+          </a:xfrm>
+          <a:prstGeom prst="rect">
+            <a:avLst/>
+          </a:prstGeom>
+          <a:noFill/>
+        </p:spPr>
+        <p:txBody>
+          <a:bodyPr wrap="none" rtlCol="0">
+            <a:spAutoFit/>
+          </a:bodyPr>
+          <a:lstStyle/>
+          <a:p>
+            <a:r>
+              <a:rPr lang="fr-FR" sz="2400" b="1" dirty="0" smtClean="0"/>
+              <a:t>16 Pickup Stations</a:t>
+            </a:r>
+            <a:endParaRPr lang="fr-FR" sz="2400" b="1" dirty="0"/>
+          </a:p>
+        </p:txBody>
+      </p:sp>
     </p:spTree>
     <p:extLst>
       <p:ext uri="{BB962C8B-B14F-4D97-AF65-F5344CB8AC3E}">
@@ -11240,7 +11322,7 @@
           <a:p>
             <a:fld id="{F17915BF-AA20-4B83-BAD9-5FAEB744B471}" type="datetime1">
               <a:rPr lang="fr-FR" smtClean="0"/>
-              <a:t>11/06/2020</a:t>
+              <a:t>12/06/2020</a:t>
             </a:fld>
             <a:endParaRPr lang="fr-FR"/>
           </a:p>
@@ -11322,6 +11404,55 @@
           </a:prstGeom>
         </p:spPr>
       </p:pic>
+      <p:sp>
+        <p:nvSpPr>
+          <p:cNvPr id="2" name="ZoneTexte 1"/>
+          <p:cNvSpPr txBox="1"/>
+          <p:nvPr/>
+        </p:nvSpPr>
+        <p:spPr>
+          <a:xfrm>
+            <a:off x="1294381" y="3244953"/>
+            <a:ext cx="627797" cy="830997"/>
+          </a:xfrm>
+          <a:prstGeom prst="rect">
+            <a:avLst/>
+          </a:prstGeom>
+          <a:noFill/>
+        </p:spPr>
+        <p:txBody>
+          <a:bodyPr wrap="square" rtlCol="0">
+            <a:spAutoFit/>
+          </a:bodyPr>
+          <a:lstStyle/>
+          <a:p>
+            <a:r>
+              <a:rPr lang="fr-FR" sz="2400" b="1" dirty="0" smtClean="0">
+                <a:solidFill>
+                  <a:schemeClr val="accent6"/>
+                </a:solidFill>
+              </a:rPr>
+              <a:t>13</a:t>
+            </a:r>
+            <a:r>
+              <a:rPr lang="fr-FR" sz="2400" b="1" dirty="0" smtClean="0"/>
+              <a:t> </a:t>
+            </a:r>
+          </a:p>
+          <a:p>
+            <a:r>
+              <a:rPr lang="fr-FR" sz="2400" b="1" dirty="0">
+                <a:solidFill>
+                  <a:schemeClr val="bg1">
+                    <a:lumMod val="65000"/>
+                  </a:schemeClr>
+                </a:solidFill>
+              </a:rPr>
+              <a:t>3</a:t>
+            </a:r>
+          </a:p>
+        </p:txBody>
+      </p:sp>
     </p:spTree>
     <p:extLst>
       <p:ext uri="{BB962C8B-B14F-4D97-AF65-F5344CB8AC3E}">
@@ -11522,7 +11653,7 @@
           <a:p>
             <a:fld id="{F17915BF-AA20-4B83-BAD9-5FAEB744B471}" type="datetime1">
               <a:rPr lang="fr-FR" smtClean="0"/>
-              <a:t>11/06/2020</a:t>
+              <a:t>12/06/2020</a:t>
             </a:fld>
             <a:endParaRPr lang="fr-FR"/>
           </a:p>
@@ -11842,7 +11973,6 @@
               <a:rPr lang="fr-FR" dirty="0" smtClean="0"/>
               <a:t>: 323.96km</a:t>
             </a:r>
-            <a:endParaRPr lang="fr-FR" dirty="0" smtClean="0"/>
           </a:p>
           <a:p>
             <a:pPr marL="0" indent="0">
@@ -12126,7 +12256,7 @@
           <a:p>
             <a:fld id="{F17915BF-AA20-4B83-BAD9-5FAEB744B471}" type="datetime1">
               <a:rPr lang="fr-FR" smtClean="0"/>
-              <a:t>11/06/2020</a:t>
+              <a:t>12/06/2020</a:t>
             </a:fld>
             <a:endParaRPr lang="fr-FR"/>
           </a:p>
@@ -12273,11 +12403,7 @@
             </a:r>
             <a:r>
               <a:rPr lang="fr-FR" b="1" dirty="0" smtClean="0"/>
-              <a:t> &amp; </a:t>
-            </a:r>
-            <a:r>
-              <a:rPr lang="fr-FR" b="1" dirty="0" smtClean="0"/>
-              <a:t>observations:</a:t>
+              <a:t> &amp; observations:</a:t>
             </a:r>
             <a:endParaRPr lang="fr-FR" b="1" dirty="0"/>
           </a:p>
@@ -12433,32 +12559,16 @@
           </a:p>
           <a:p>
             <a:r>
+              <a:rPr lang="fr-FR" dirty="0"/>
+              <a:t>C</a:t>
+            </a:r>
+            <a:r>
+              <a:rPr lang="fr-FR" dirty="0" smtClean="0"/>
+              <a:t>omparative </a:t>
+            </a:r>
+            <a:r>
               <a:rPr lang="fr-FR" dirty="0" err="1" smtClean="0"/>
-              <a:t>Highlight</a:t>
-            </a:r>
-            <a:r>
-              <a:rPr lang="fr-FR" dirty="0" smtClean="0"/>
-              <a:t> the </a:t>
-            </a:r>
-            <a:r>
-              <a:rPr lang="fr-FR" dirty="0" err="1" smtClean="0"/>
-              <a:t>meaning</a:t>
-            </a:r>
-            <a:r>
-              <a:rPr lang="fr-FR" dirty="0" smtClean="0"/>
-              <a:t> of the </a:t>
-            </a:r>
-            <a:r>
-              <a:rPr lang="fr-FR" dirty="0" err="1" smtClean="0"/>
-              <a:t>results</a:t>
-            </a:r>
-            <a:r>
-              <a:rPr lang="fr-FR" dirty="0" smtClean="0"/>
-              <a:t> in relation to </a:t>
-            </a:r>
-            <a:r>
-              <a:rPr lang="fr-FR" dirty="0" err="1" smtClean="0"/>
-              <a:t>my</a:t>
+              <a:t>studies</a:t>
             </a:r>
             <a:r>
               <a:rPr lang="fr-FR" dirty="0" smtClean="0"/>
@@ -12466,15 +12576,22 @@
             </a:r>
             <a:r>
               <a:rPr lang="fr-FR" dirty="0" err="1" smtClean="0"/>
-              <a:t>studies</a:t>
+              <a:t>with</a:t>
             </a:r>
             <a:r>
               <a:rPr lang="fr-FR" dirty="0" smtClean="0"/>
-              <a:t> and </a:t>
-            </a:r>
+              <a:t> real data</a:t>
+            </a:r>
+            <a:r>
+              <a:rPr lang="fr-FR" dirty="0" smtClean="0"/>
+              <a:t>.</a:t>
+            </a:r>
+            <a:endParaRPr lang="fr-FR" dirty="0" smtClean="0"/>
+          </a:p>
+          <a:p>
             <a:r>
               <a:rPr lang="fr-FR" dirty="0" err="1" smtClean="0"/>
-              <a:t>this</a:t>
+              <a:t>Shared</a:t>
             </a:r>
             <a:r>
               <a:rPr lang="fr-FR" dirty="0" smtClean="0"/>
@@ -12482,7 +12599,7 @@
             </a:r>
             <a:r>
               <a:rPr lang="fr-FR" dirty="0" err="1" smtClean="0"/>
-              <a:t>current</a:t>
+              <a:t>mobility</a:t>
             </a:r>
             <a:r>
               <a:rPr lang="fr-FR" dirty="0" smtClean="0"/>
@@ -12490,18 +12607,25 @@
             </a:r>
             <a:r>
               <a:rPr lang="fr-FR" dirty="0" err="1" smtClean="0"/>
-              <a:t>year</a:t>
-            </a:r>
-            <a:endParaRPr lang="fr-FR" dirty="0" smtClean="0"/>
-          </a:p>
-          <a:p>
+              <a:t>is</a:t>
+            </a:r>
             <a:r>
               <a:rPr lang="fr-FR" dirty="0" smtClean="0"/>
-              <a:t>Talk about </a:t>
+              <a:t> a non </a:t>
             </a:r>
             <a:r>
               <a:rPr lang="fr-FR" dirty="0" err="1" smtClean="0"/>
-              <a:t>making</a:t>
+              <a:t>formal</a:t>
+            </a:r>
+            <a:r>
+              <a:rPr lang="fr-FR" dirty="0" smtClean="0"/>
+              <a:t> feeder to public transport.</a:t>
+            </a:r>
+          </a:p>
+          <a:p>
+            <a:r>
+              <a:rPr lang="fr-FR" dirty="0" err="1" smtClean="0"/>
+              <a:t>Reduce</a:t>
             </a:r>
             <a:r>
               <a:rPr lang="fr-FR" dirty="0" smtClean="0"/>
@@ -12509,20 +12633,44 @@
             </a:r>
             <a:r>
               <a:rPr lang="fr-FR" dirty="0" err="1" smtClean="0"/>
-              <a:t>actual</a:t>
-            </a:r>
-            <a:r>
-              <a:rPr lang="fr-FR" dirty="0" smtClean="0"/>
-              <a:t> comparative </a:t>
-            </a:r>
-            <a:r>
-              <a:rPr lang="fr-FR" dirty="0" err="1" smtClean="0"/>
-              <a:t>studies</a:t>
+              <a:t>carbon</a:t>
             </a:r>
             <a:r>
               <a:rPr lang="fr-FR" dirty="0" smtClean="0"/>
               <a:t> </a:t>
             </a:r>
+            <a:r>
+              <a:rPr lang="fr-FR" dirty="0" err="1" smtClean="0"/>
+              <a:t>footprint</a:t>
+            </a:r>
+            <a:r>
+              <a:rPr lang="fr-FR" dirty="0" smtClean="0"/>
+              <a:t>.</a:t>
+            </a:r>
+          </a:p>
+          <a:p>
+            <a:r>
+              <a:rPr lang="en-US" dirty="0"/>
+              <a:t>The results show that the algorithm becomes more efficient when we have less timeslots, in this example it would relate to a large number of bookings in a peak </a:t>
+            </a:r>
+            <a:r>
+              <a:rPr lang="fr-FR" dirty="0"/>
+              <a:t>time</a:t>
+            </a:r>
+            <a:r>
+              <a:rPr lang="fr-FR" dirty="0" smtClean="0"/>
+              <a:t>.</a:t>
+            </a:r>
+          </a:p>
+          <a:p>
+            <a:r>
+              <a:rPr lang="fr-FR" dirty="0" smtClean="0"/>
+              <a:t>Limitations.</a:t>
+            </a:r>
+            <a:endParaRPr lang="fr-FR" dirty="0"/>
+          </a:p>
+          <a:p>
+            <a:endParaRPr lang="fr-FR" dirty="0" smtClean="0"/>
           </a:p>
           <a:p>
             <a:endParaRPr lang="fr-FR" dirty="0"/>
@@ -12546,7 +12694,7 @@
           <a:p>
             <a:fld id="{A2867659-1A1C-4B28-856C-A2478D890D8E}" type="datetime1">
               <a:rPr lang="fr-FR" smtClean="0"/>
-              <a:t>11/06/2020</a:t>
+              <a:t>12/06/2020</a:t>
             </a:fld>
             <a:endParaRPr lang="fr-FR"/>
           </a:p>
@@ -12641,9 +12789,329 @@
   <p:timing>
     <p:tnLst>
       <p:par>
-        <p:cTn id="1" dur="indefinite" restart="never" nodeType="tmRoot"/>
+        <p:cTn id="1" dur="indefinite" restart="never" nodeType="tmRoot">
+          <p:childTnLst>
+            <p:seq concurrent="1" nextAc="seek">
+              <p:cTn id="2" dur="indefinite" nodeType="mainSeq">
+                <p:childTnLst>
+                  <p:par>
+                    <p:cTn id="3" fill="hold">
+                      <p:stCondLst>
+                        <p:cond delay="indefinite"/>
+                      </p:stCondLst>
+                      <p:childTnLst>
+                        <p:par>
+                          <p:cTn id="4" fill="hold">
+                            <p:stCondLst>
+                              <p:cond delay="0"/>
+                            </p:stCondLst>
+                            <p:childTnLst>
+                              <p:par>
+                                <p:cTn id="5" presetID="1" presetClass="entr" presetSubtype="0" fill="hold" grpId="0" nodeType="clickEffect">
+                                  <p:stCondLst>
+                                    <p:cond delay="0"/>
+                                  </p:stCondLst>
+                                  <p:childTnLst>
+                                    <p:set>
+                                      <p:cBhvr>
+                                        <p:cTn id="6" dur="1" fill="hold">
+                                          <p:stCondLst>
+                                            <p:cond delay="0"/>
+                                          </p:stCondLst>
+                                        </p:cTn>
+                                        <p:tgtEl>
+                                          <p:spTgt spid="3">
+                                            <p:txEl>
+                                              <p:pRg st="1" end="1"/>
+                                            </p:txEl>
+                                          </p:spTgt>
+                                        </p:tgtEl>
+                                        <p:attrNameLst>
+                                          <p:attrName>style.visibility</p:attrName>
+                                        </p:attrNameLst>
+                                      </p:cBhvr>
+                                      <p:to>
+                                        <p:strVal val="visible"/>
+                                      </p:to>
+                                    </p:set>
+                                  </p:childTnLst>
+                                </p:cTn>
+                              </p:par>
+                            </p:childTnLst>
+                          </p:cTn>
+                        </p:par>
+                      </p:childTnLst>
+                    </p:cTn>
+                  </p:par>
+                  <p:par>
+                    <p:cTn id="7" fill="hold">
+                      <p:stCondLst>
+                        <p:cond delay="indefinite"/>
+                      </p:stCondLst>
+                      <p:childTnLst>
+                        <p:par>
+                          <p:cTn id="8" fill="hold">
+                            <p:stCondLst>
+                              <p:cond delay="0"/>
+                            </p:stCondLst>
+                            <p:childTnLst>
+                              <p:par>
+                                <p:cTn id="9" presetID="1" presetClass="entr" presetSubtype="0" fill="hold" grpId="0" nodeType="clickEffect">
+                                  <p:stCondLst>
+                                    <p:cond delay="0"/>
+                                  </p:stCondLst>
+                                  <p:childTnLst>
+                                    <p:set>
+                                      <p:cBhvr>
+                                        <p:cTn id="10" dur="1" fill="hold">
+                                          <p:stCondLst>
+                                            <p:cond delay="0"/>
+                                          </p:stCondLst>
+                                        </p:cTn>
+                                        <p:tgtEl>
+                                          <p:spTgt spid="3">
+                                            <p:txEl>
+                                              <p:pRg st="2" end="2"/>
+                                            </p:txEl>
+                                          </p:spTgt>
+                                        </p:tgtEl>
+                                        <p:attrNameLst>
+                                          <p:attrName>style.visibility</p:attrName>
+                                        </p:attrNameLst>
+                                      </p:cBhvr>
+                                      <p:to>
+                                        <p:strVal val="visible"/>
+                                      </p:to>
+                                    </p:set>
+                                  </p:childTnLst>
+                                </p:cTn>
+                              </p:par>
+                            </p:childTnLst>
+                          </p:cTn>
+                        </p:par>
+                      </p:childTnLst>
+                    </p:cTn>
+                  </p:par>
+                  <p:par>
+                    <p:cTn id="11" fill="hold">
+                      <p:stCondLst>
+                        <p:cond delay="indefinite"/>
+                      </p:stCondLst>
+                      <p:childTnLst>
+                        <p:par>
+                          <p:cTn id="12" fill="hold">
+                            <p:stCondLst>
+                              <p:cond delay="0"/>
+                            </p:stCondLst>
+                            <p:childTnLst>
+                              <p:par>
+                                <p:cTn id="13" presetID="1" presetClass="entr" presetSubtype="0" fill="hold" grpId="0" nodeType="clickEffect">
+                                  <p:stCondLst>
+                                    <p:cond delay="0"/>
+                                  </p:stCondLst>
+                                  <p:childTnLst>
+                                    <p:set>
+                                      <p:cBhvr>
+                                        <p:cTn id="14" dur="1" fill="hold">
+                                          <p:stCondLst>
+                                            <p:cond delay="0"/>
+                                          </p:stCondLst>
+                                        </p:cTn>
+                                        <p:tgtEl>
+                                          <p:spTgt spid="3">
+                                            <p:txEl>
+                                              <p:pRg st="3" end="3"/>
+                                            </p:txEl>
+                                          </p:spTgt>
+                                        </p:tgtEl>
+                                        <p:attrNameLst>
+                                          <p:attrName>style.visibility</p:attrName>
+                                        </p:attrNameLst>
+                                      </p:cBhvr>
+                                      <p:to>
+                                        <p:strVal val="visible"/>
+                                      </p:to>
+                                    </p:set>
+                                  </p:childTnLst>
+                                </p:cTn>
+                              </p:par>
+                            </p:childTnLst>
+                          </p:cTn>
+                        </p:par>
+                      </p:childTnLst>
+                    </p:cTn>
+                  </p:par>
+                  <p:par>
+                    <p:cTn id="15" fill="hold">
+                      <p:stCondLst>
+                        <p:cond delay="indefinite"/>
+                      </p:stCondLst>
+                      <p:childTnLst>
+                        <p:par>
+                          <p:cTn id="16" fill="hold">
+                            <p:stCondLst>
+                              <p:cond delay="0"/>
+                            </p:stCondLst>
+                            <p:childTnLst>
+                              <p:par>
+                                <p:cTn id="17" presetID="1" presetClass="entr" presetSubtype="0" fill="hold" grpId="0" nodeType="clickEffect">
+                                  <p:stCondLst>
+                                    <p:cond delay="0"/>
+                                  </p:stCondLst>
+                                  <p:childTnLst>
+                                    <p:set>
+                                      <p:cBhvr>
+                                        <p:cTn id="18" dur="1" fill="hold">
+                                          <p:stCondLst>
+                                            <p:cond delay="0"/>
+                                          </p:stCondLst>
+                                        </p:cTn>
+                                        <p:tgtEl>
+                                          <p:spTgt spid="3">
+                                            <p:txEl>
+                                              <p:pRg st="4" end="4"/>
+                                            </p:txEl>
+                                          </p:spTgt>
+                                        </p:tgtEl>
+                                        <p:attrNameLst>
+                                          <p:attrName>style.visibility</p:attrName>
+                                        </p:attrNameLst>
+                                      </p:cBhvr>
+                                      <p:to>
+                                        <p:strVal val="visible"/>
+                                      </p:to>
+                                    </p:set>
+                                  </p:childTnLst>
+                                </p:cTn>
+                              </p:par>
+                            </p:childTnLst>
+                          </p:cTn>
+                        </p:par>
+                      </p:childTnLst>
+                    </p:cTn>
+                  </p:par>
+                  <p:par>
+                    <p:cTn id="19" fill="hold">
+                      <p:stCondLst>
+                        <p:cond delay="indefinite"/>
+                      </p:stCondLst>
+                      <p:childTnLst>
+                        <p:par>
+                          <p:cTn id="20" fill="hold">
+                            <p:stCondLst>
+                              <p:cond delay="0"/>
+                            </p:stCondLst>
+                            <p:childTnLst>
+                              <p:par>
+                                <p:cTn id="21" presetID="1" presetClass="entr" presetSubtype="0" fill="hold" grpId="0" nodeType="clickEffect">
+                                  <p:stCondLst>
+                                    <p:cond delay="0"/>
+                                  </p:stCondLst>
+                                  <p:childTnLst>
+                                    <p:set>
+                                      <p:cBhvr>
+                                        <p:cTn id="22" dur="1" fill="hold">
+                                          <p:stCondLst>
+                                            <p:cond delay="0"/>
+                                          </p:stCondLst>
+                                        </p:cTn>
+                                        <p:tgtEl>
+                                          <p:spTgt spid="3">
+                                            <p:txEl>
+                                              <p:pRg st="5" end="5"/>
+                                            </p:txEl>
+                                          </p:spTgt>
+                                        </p:tgtEl>
+                                        <p:attrNameLst>
+                                          <p:attrName>style.visibility</p:attrName>
+                                        </p:attrNameLst>
+                                      </p:cBhvr>
+                                      <p:to>
+                                        <p:strVal val="visible"/>
+                                      </p:to>
+                                    </p:set>
+                                  </p:childTnLst>
+                                </p:cTn>
+                              </p:par>
+                            </p:childTnLst>
+                          </p:cTn>
+                        </p:par>
+                      </p:childTnLst>
+                    </p:cTn>
+                  </p:par>
+                  <p:par>
+                    <p:cTn id="23" fill="hold">
+                      <p:stCondLst>
+                        <p:cond delay="indefinite"/>
+                      </p:stCondLst>
+                      <p:childTnLst>
+                        <p:par>
+                          <p:cTn id="24" fill="hold">
+                            <p:stCondLst>
+                              <p:cond delay="0"/>
+                            </p:stCondLst>
+                            <p:childTnLst>
+                              <p:par>
+                                <p:cTn id="25" presetID="1" presetClass="entr" presetSubtype="0" fill="hold" grpId="0" nodeType="clickEffect">
+                                  <p:stCondLst>
+                                    <p:cond delay="0"/>
+                                  </p:stCondLst>
+                                  <p:childTnLst>
+                                    <p:set>
+                                      <p:cBhvr>
+                                        <p:cTn id="26" dur="1" fill="hold">
+                                          <p:stCondLst>
+                                            <p:cond delay="0"/>
+                                          </p:stCondLst>
+                                        </p:cTn>
+                                        <p:tgtEl>
+                                          <p:spTgt spid="3">
+                                            <p:txEl>
+                                              <p:pRg st="6" end="6"/>
+                                            </p:txEl>
+                                          </p:spTgt>
+                                        </p:tgtEl>
+                                        <p:attrNameLst>
+                                          <p:attrName>style.visibility</p:attrName>
+                                        </p:attrNameLst>
+                                      </p:cBhvr>
+                                      <p:to>
+                                        <p:strVal val="visible"/>
+                                      </p:to>
+                                    </p:set>
+                                  </p:childTnLst>
+                                </p:cTn>
+                              </p:par>
+                            </p:childTnLst>
+                          </p:cTn>
+                        </p:par>
+                      </p:childTnLst>
+                    </p:cTn>
+                  </p:par>
+                </p:childTnLst>
+              </p:cTn>
+              <p:prevCondLst>
+                <p:cond evt="onPrev" delay="0">
+                  <p:tgtEl>
+                    <p:sldTgt/>
+                  </p:tgtEl>
+                </p:cond>
+              </p:prevCondLst>
+              <p:nextCondLst>
+                <p:cond evt="onNext" delay="0">
+                  <p:tgtEl>
+                    <p:sldTgt/>
+                  </p:tgtEl>
+                </p:cond>
+              </p:nextCondLst>
+            </p:seq>
+          </p:childTnLst>
+        </p:cTn>
       </p:par>
     </p:tnLst>
+    <p:bldLst>
+      <p:bldP spid="3" grpId="0" build="p"/>
+    </p:bldLst>
   </p:timing>
 </p:sld>
 </file>
@@ -12678,7 +13146,7 @@
         <p:spPr>
           <a:xfrm>
             <a:off x="838200" y="365125"/>
-            <a:ext cx="10515600" cy="562923"/>
+            <a:ext cx="10515600" cy="576571"/>
           </a:xfrm>
         </p:spPr>
         <p:txBody>
@@ -12689,7 +13157,23 @@
           <a:p>
             <a:r>
               <a:rPr lang="fr-FR" b="1" dirty="0" smtClean="0"/>
-              <a:t>Conclusion:</a:t>
+              <a:t>The contribution of </a:t>
+            </a:r>
+            <a:r>
+              <a:rPr lang="fr-FR" b="1" dirty="0" err="1" smtClean="0"/>
+              <a:t>this</a:t>
+            </a:r>
+            <a:r>
+              <a:rPr lang="fr-FR" b="1" dirty="0" smtClean="0"/>
+              <a:t> </a:t>
+            </a:r>
+            <a:r>
+              <a:rPr lang="fr-FR" b="1" dirty="0" err="1" smtClean="0"/>
+              <a:t>project</a:t>
+            </a:r>
+            <a:r>
+              <a:rPr lang="fr-FR" b="1" dirty="0" smtClean="0"/>
+              <a:t>:</a:t>
             </a:r>
             <a:endParaRPr lang="fr-FR" b="1" dirty="0"/>
           </a:p>
@@ -12707,8 +13191,8 @@
         </p:nvSpPr>
         <p:spPr>
           <a:xfrm>
-            <a:off x="838200" y="928048"/>
-            <a:ext cx="10515600" cy="5248915"/>
+            <a:off x="838200" y="1153760"/>
+            <a:ext cx="10515600" cy="5023203"/>
           </a:xfrm>
         </p:spPr>
         <p:txBody>
@@ -12718,16 +13202,16 @@
           <a:lstStyle/>
           <a:p>
             <a:r>
+              <a:rPr lang="fr-FR" dirty="0" smtClean="0"/>
+              <a:t>The state of the art </a:t>
+            </a:r>
+            <a:r>
+              <a:rPr lang="fr-FR" dirty="0" smtClean="0"/>
+              <a:t>&amp; </a:t>
+            </a:r>
+            <a:r>
               <a:rPr lang="fr-FR" dirty="0" err="1" smtClean="0"/>
-              <a:t>Here</a:t>
-            </a:r>
-            <a:r>
-              <a:rPr lang="fr-FR" dirty="0" smtClean="0"/>
-              <a:t> I </a:t>
-            </a:r>
-            <a:r>
-              <a:rPr lang="fr-FR" dirty="0" err="1" smtClean="0"/>
-              <a:t>will</a:t>
+              <a:t>literature</a:t>
             </a:r>
             <a:r>
               <a:rPr lang="fr-FR" dirty="0" smtClean="0"/>
@@ -12735,179 +13219,142 @@
             </a:r>
             <a:r>
               <a:rPr lang="fr-FR" dirty="0" err="1" smtClean="0"/>
-              <a:t>restate</a:t>
+              <a:t>review</a:t>
+            </a:r>
+            <a:r>
+              <a:rPr lang="fr-FR" dirty="0"/>
+              <a:t>.</a:t>
+            </a:r>
+            <a:endParaRPr lang="fr-FR" dirty="0" smtClean="0"/>
+          </a:p>
+          <a:p>
+            <a:r>
+              <a:rPr lang="en-US" dirty="0" smtClean="0"/>
+              <a:t>Case studies analyzing the potential impact of feeding transport systems.</a:t>
+            </a:r>
+            <a:endParaRPr lang="en-US" dirty="0" smtClean="0"/>
+          </a:p>
+          <a:p>
+            <a:r>
+              <a:rPr lang="en-US" dirty="0" smtClean="0"/>
+              <a:t>Ability to identify relevancy.</a:t>
+            </a:r>
+            <a:endParaRPr lang="en-US" dirty="0" smtClean="0"/>
+          </a:p>
+          <a:p>
+            <a:r>
+              <a:rPr lang="en-US" dirty="0" smtClean="0"/>
+              <a:t>In </a:t>
+            </a:r>
+            <a:r>
+              <a:rPr lang="en-US" dirty="0"/>
+              <a:t>the state of the art section I showed the </a:t>
+            </a:r>
+            <a:r>
+              <a:rPr lang="en-US" dirty="0" smtClean="0"/>
+              <a:t>connection in literature </a:t>
+            </a:r>
+            <a:r>
+              <a:rPr lang="en-US" dirty="0"/>
+              <a:t>between public </a:t>
+            </a:r>
+            <a:r>
+              <a:rPr lang="en-US" dirty="0" smtClean="0"/>
+              <a:t>transport </a:t>
+            </a:r>
+            <a:r>
+              <a:rPr lang="fr-FR" dirty="0" smtClean="0"/>
+              <a:t>and </a:t>
+            </a:r>
+            <a:r>
+              <a:rPr lang="fr-FR" dirty="0" err="1"/>
+              <a:t>shared</a:t>
+            </a:r>
+            <a:r>
+              <a:rPr lang="fr-FR" dirty="0"/>
+              <a:t> </a:t>
+            </a:r>
+            <a:r>
+              <a:rPr lang="fr-FR" dirty="0" err="1" smtClean="0"/>
+              <a:t>mobility</a:t>
+            </a:r>
+            <a:endParaRPr lang="fr-FR" dirty="0" smtClean="0"/>
+          </a:p>
+          <a:p>
+            <a:r>
+              <a:rPr lang="en-US" dirty="0"/>
+              <a:t>I showed how can the DAR problem be reformulated to answer to the </a:t>
+            </a:r>
+            <a:r>
+              <a:rPr lang="en-US" dirty="0" smtClean="0"/>
+              <a:t>gap </a:t>
+            </a:r>
+            <a:r>
+              <a:rPr lang="fr-FR" dirty="0" err="1" smtClean="0"/>
+              <a:t>that</a:t>
             </a:r>
             <a:r>
               <a:rPr lang="fr-FR" dirty="0" smtClean="0"/>
               <a:t> </a:t>
             </a:r>
             <a:r>
+              <a:rPr lang="fr-FR" dirty="0" err="1"/>
+              <a:t>currently</a:t>
+            </a:r>
+            <a:r>
+              <a:rPr lang="fr-FR" dirty="0"/>
+              <a:t> </a:t>
+            </a:r>
+            <a:r>
               <a:rPr lang="fr-FR" dirty="0" err="1" smtClean="0"/>
-              <a:t>my</a:t>
+              <a:t>exists</a:t>
+            </a:r>
+            <a:endParaRPr lang="fr-FR" dirty="0" smtClean="0"/>
+          </a:p>
+          <a:p>
+            <a:r>
+              <a:rPr lang="en-US" dirty="0" smtClean="0"/>
+              <a:t>I gained confidence &amp; motivation </a:t>
+            </a:r>
+            <a:r>
+              <a:rPr lang="en-US" dirty="0"/>
+              <a:t>to continue in this research</a:t>
+            </a:r>
+            <a:r>
+              <a:rPr lang="en-US" dirty="0" smtClean="0"/>
+              <a:t>.</a:t>
+            </a:r>
+          </a:p>
+          <a:p>
+            <a:r>
+              <a:rPr lang="fr-FR" dirty="0" err="1"/>
+              <a:t>Programming</a:t>
+            </a:r>
+            <a:r>
+              <a:rPr lang="fr-FR" dirty="0"/>
+              <a:t> </a:t>
+            </a:r>
+            <a:r>
+              <a:rPr lang="fr-FR" dirty="0" err="1"/>
+              <a:t>Skills</a:t>
+            </a:r>
+            <a:r>
+              <a:rPr lang="fr-FR" dirty="0"/>
+              <a:t> (Julia, Python, </a:t>
+            </a:r>
+            <a:r>
+              <a:rPr lang="fr-FR" dirty="0" err="1"/>
+              <a:t>Gurobi</a:t>
+            </a:r>
+            <a:r>
+              <a:rPr lang="fr-FR" dirty="0"/>
+              <a:t> &amp; CPLEX</a:t>
             </a:r>
             <a:r>
               <a:rPr lang="fr-FR" dirty="0" smtClean="0"/>
-              <a:t> </a:t>
-            </a:r>
-            <a:r>
-              <a:rPr lang="fr-FR" dirty="0" err="1" smtClean="0"/>
-              <a:t>research</a:t>
-            </a:r>
-            <a:r>
-              <a:rPr lang="fr-FR" dirty="0" smtClean="0"/>
-              <a:t> questions </a:t>
-            </a:r>
-            <a:r>
-              <a:rPr lang="en-US" dirty="0" smtClean="0"/>
-              <a:t>The </a:t>
-            </a:r>
-            <a:r>
-              <a:rPr lang="en-US" dirty="0"/>
-              <a:t>results show that the algorithm becomes more </a:t>
-            </a:r>
-            <a:r>
-              <a:rPr lang="en-US" dirty="0" smtClean="0"/>
-              <a:t>efficient </a:t>
-            </a:r>
-            <a:r>
-              <a:rPr lang="en-US" dirty="0"/>
-              <a:t>when we have </a:t>
-            </a:r>
-            <a:r>
-              <a:rPr lang="en-US" dirty="0" smtClean="0"/>
-              <a:t>less timeslots</a:t>
-            </a:r>
-            <a:r>
-              <a:rPr lang="en-US" dirty="0"/>
-              <a:t>, in this example it would relate to a large number of bookings in a </a:t>
-            </a:r>
-            <a:r>
-              <a:rPr lang="en-US" dirty="0" smtClean="0"/>
-              <a:t>peak </a:t>
-            </a:r>
-            <a:r>
-              <a:rPr lang="fr-FR" dirty="0" smtClean="0"/>
-              <a:t>time</a:t>
-            </a:r>
-            <a:r>
-              <a:rPr lang="fr-FR" dirty="0"/>
-              <a:t>.</a:t>
-            </a:r>
-            <a:endParaRPr lang="fr-FR" dirty="0" smtClean="0"/>
-          </a:p>
-          <a:p>
-            <a:r>
-              <a:rPr lang="fr-FR" dirty="0" smtClean="0"/>
-              <a:t>Show </a:t>
-            </a:r>
-            <a:r>
-              <a:rPr lang="fr-FR" dirty="0" err="1" smtClean="0"/>
-              <a:t>my</a:t>
-            </a:r>
-            <a:r>
-              <a:rPr lang="fr-FR" dirty="0" smtClean="0"/>
-              <a:t> contribution</a:t>
-            </a:r>
-          </a:p>
-          <a:p>
-            <a:r>
-              <a:rPr lang="fr-FR" dirty="0" smtClean="0"/>
-              <a:t>State the limitations of the </a:t>
-            </a:r>
-            <a:r>
-              <a:rPr lang="fr-FR" dirty="0" err="1" smtClean="0"/>
-              <a:t>work</a:t>
-            </a:r>
-            <a:r>
-              <a:rPr lang="fr-FR" dirty="0" smtClean="0"/>
-              <a:t> </a:t>
-            </a:r>
-            <a:r>
-              <a:rPr lang="fr-FR" dirty="0" err="1" smtClean="0"/>
-              <a:t>you</a:t>
-            </a:r>
-            <a:r>
-              <a:rPr lang="fr-FR" dirty="0" smtClean="0"/>
-              <a:t> have </a:t>
-            </a:r>
-            <a:r>
-              <a:rPr lang="fr-FR" dirty="0" err="1" smtClean="0"/>
-              <a:t>done</a:t>
-            </a:r>
-            <a:endParaRPr lang="fr-FR" dirty="0" smtClean="0"/>
-          </a:p>
-          <a:p>
-            <a:r>
-              <a:rPr lang="fr-FR" dirty="0" err="1" smtClean="0"/>
-              <a:t>Make</a:t>
-            </a:r>
-            <a:r>
-              <a:rPr lang="fr-FR" dirty="0" smtClean="0"/>
-              <a:t> </a:t>
-            </a:r>
-            <a:r>
-              <a:rPr lang="fr-FR" dirty="0" err="1" smtClean="0"/>
-              <a:t>recommendations</a:t>
-            </a:r>
-            <a:r>
-              <a:rPr lang="fr-FR" dirty="0" smtClean="0"/>
-              <a:t> and </a:t>
-            </a:r>
-            <a:r>
-              <a:rPr lang="fr-FR" dirty="0" err="1" smtClean="0"/>
-              <a:t>discuss</a:t>
-            </a:r>
-            <a:r>
-              <a:rPr lang="fr-FR" dirty="0" smtClean="0"/>
-              <a:t> </a:t>
-            </a:r>
-            <a:r>
-              <a:rPr lang="fr-FR" dirty="0" err="1" smtClean="0"/>
-              <a:t>next</a:t>
-            </a:r>
-            <a:r>
-              <a:rPr lang="fr-FR" dirty="0" smtClean="0"/>
-              <a:t> </a:t>
-            </a:r>
-            <a:r>
-              <a:rPr lang="fr-FR" dirty="0" err="1" smtClean="0"/>
-              <a:t>steps</a:t>
-            </a:r>
-            <a:endParaRPr lang="fr-FR" dirty="0" smtClean="0"/>
-          </a:p>
-          <a:p>
-            <a:r>
-              <a:rPr lang="en-US" dirty="0"/>
-              <a:t>In this set of data the total distance </a:t>
-            </a:r>
-            <a:r>
-              <a:rPr lang="en-US" dirty="0" err="1"/>
-              <a:t>walke</a:t>
-            </a:r>
-            <a:r>
-              <a:rPr lang="en-US" dirty="0"/>
-              <a:t> by the bookings is 36:715km, </a:t>
-            </a:r>
-            <a:r>
-              <a:rPr lang="en-US" dirty="0" smtClean="0"/>
-              <a:t>by comparing </a:t>
-            </a:r>
-            <a:r>
-              <a:rPr lang="en-US" dirty="0"/>
-              <a:t>it to the total distance by vehicles 323:96km, the walking </a:t>
-            </a:r>
-            <a:r>
-              <a:rPr lang="en-US" dirty="0" smtClean="0"/>
-              <a:t>distance covers </a:t>
-            </a:r>
-            <a:r>
-              <a:rPr lang="en-US" dirty="0"/>
-              <a:t>around 11% of the total travel distance.</a:t>
-            </a:r>
-            <a:endParaRPr lang="fr-FR" dirty="0" smtClean="0"/>
-          </a:p>
-          <a:p>
-            <a:endParaRPr lang="fr-FR" dirty="0"/>
+              <a:t>)</a:t>
+            </a:r>
+            <a:endParaRPr lang="en-US" dirty="0" smtClean="0"/>
           </a:p>
         </p:txBody>
       </p:sp>
@@ -12926,9 +13373,9 @@
           <a:bodyPr/>
           <a:lstStyle/>
           <a:p>
-            <a:fld id="{84DCF565-6414-42C6-AF1E-80E3D28FC5F9}" type="datetime1">
+            <a:fld id="{F17915BF-AA20-4B83-BAD9-5FAEB744B471}" type="datetime1">
               <a:rPr lang="fr-FR" smtClean="0"/>
-              <a:t>11/06/2020</a:t>
+              <a:t>12/06/2020</a:t>
             </a:fld>
             <a:endParaRPr lang="fr-FR"/>
           </a:p>
@@ -13013,7 +13460,7 @@
     </p:spTree>
     <p:extLst>
       <p:ext uri="{BB962C8B-B14F-4D97-AF65-F5344CB8AC3E}">
-        <p14:creationId xmlns:p14="http://schemas.microsoft.com/office/powerpoint/2010/main" val="304003118"/>
+        <p14:creationId xmlns:p14="http://schemas.microsoft.com/office/powerpoint/2010/main" val="2967258286"/>
       </p:ext>
     </p:extLst>
   </p:cSld>
@@ -13023,9 +13470,378 @@
   <p:timing>
     <p:tnLst>
       <p:par>
-        <p:cTn id="1" dur="indefinite" restart="never" nodeType="tmRoot"/>
+        <p:cTn id="1" dur="indefinite" restart="never" nodeType="tmRoot">
+          <p:childTnLst>
+            <p:seq concurrent="1" nextAc="seek">
+              <p:cTn id="2" dur="indefinite" nodeType="mainSeq">
+                <p:childTnLst>
+                  <p:par>
+                    <p:cTn id="3" fill="hold">
+                      <p:stCondLst>
+                        <p:cond delay="indefinite"/>
+                      </p:stCondLst>
+                      <p:childTnLst>
+                        <p:par>
+                          <p:cTn id="4" fill="hold">
+                            <p:stCondLst>
+                              <p:cond delay="0"/>
+                            </p:stCondLst>
+                            <p:childTnLst>
+                              <p:par>
+                                <p:cTn id="5" presetID="1" presetClass="entr" presetSubtype="0" fill="hold" grpId="0" nodeType="clickEffect">
+                                  <p:stCondLst>
+                                    <p:cond delay="0"/>
+                                  </p:stCondLst>
+                                  <p:childTnLst>
+                                    <p:set>
+                                      <p:cBhvr>
+                                        <p:cTn id="6" dur="1" fill="hold">
+                                          <p:stCondLst>
+                                            <p:cond delay="0"/>
+                                          </p:stCondLst>
+                                        </p:cTn>
+                                        <p:tgtEl>
+                                          <p:spTgt spid="3">
+                                            <p:txEl>
+                                              <p:pRg st="0" end="0"/>
+                                            </p:txEl>
+                                          </p:spTgt>
+                                        </p:tgtEl>
+                                        <p:attrNameLst>
+                                          <p:attrName>style.visibility</p:attrName>
+                                        </p:attrNameLst>
+                                      </p:cBhvr>
+                                      <p:to>
+                                        <p:strVal val="visible"/>
+                                      </p:to>
+                                    </p:set>
+                                  </p:childTnLst>
+                                </p:cTn>
+                              </p:par>
+                            </p:childTnLst>
+                          </p:cTn>
+                        </p:par>
+                      </p:childTnLst>
+                    </p:cTn>
+                  </p:par>
+                  <p:par>
+                    <p:cTn id="7" fill="hold">
+                      <p:stCondLst>
+                        <p:cond delay="indefinite"/>
+                      </p:stCondLst>
+                      <p:childTnLst>
+                        <p:par>
+                          <p:cTn id="8" fill="hold">
+                            <p:stCondLst>
+                              <p:cond delay="0"/>
+                            </p:stCondLst>
+                            <p:childTnLst>
+                              <p:par>
+                                <p:cTn id="9" presetID="1" presetClass="entr" presetSubtype="0" fill="hold" grpId="0" nodeType="clickEffect">
+                                  <p:stCondLst>
+                                    <p:cond delay="0"/>
+                                  </p:stCondLst>
+                                  <p:childTnLst>
+                                    <p:set>
+                                      <p:cBhvr>
+                                        <p:cTn id="10" dur="1" fill="hold">
+                                          <p:stCondLst>
+                                            <p:cond delay="0"/>
+                                          </p:stCondLst>
+                                        </p:cTn>
+                                        <p:tgtEl>
+                                          <p:spTgt spid="3">
+                                            <p:txEl>
+                                              <p:pRg st="1" end="1"/>
+                                            </p:txEl>
+                                          </p:spTgt>
+                                        </p:tgtEl>
+                                        <p:attrNameLst>
+                                          <p:attrName>style.visibility</p:attrName>
+                                        </p:attrNameLst>
+                                      </p:cBhvr>
+                                      <p:to>
+                                        <p:strVal val="visible"/>
+                                      </p:to>
+                                    </p:set>
+                                  </p:childTnLst>
+                                </p:cTn>
+                              </p:par>
+                            </p:childTnLst>
+                          </p:cTn>
+                        </p:par>
+                      </p:childTnLst>
+                    </p:cTn>
+                  </p:par>
+                  <p:par>
+                    <p:cTn id="11" fill="hold">
+                      <p:stCondLst>
+                        <p:cond delay="indefinite"/>
+                      </p:stCondLst>
+                      <p:childTnLst>
+                        <p:par>
+                          <p:cTn id="12" fill="hold">
+                            <p:stCondLst>
+                              <p:cond delay="0"/>
+                            </p:stCondLst>
+                            <p:childTnLst>
+                              <p:par>
+                                <p:cTn id="13" presetID="1" presetClass="entr" presetSubtype="0" fill="hold" grpId="0" nodeType="clickEffect">
+                                  <p:stCondLst>
+                                    <p:cond delay="0"/>
+                                  </p:stCondLst>
+                                  <p:childTnLst>
+                                    <p:set>
+                                      <p:cBhvr>
+                                        <p:cTn id="14" dur="1" fill="hold">
+                                          <p:stCondLst>
+                                            <p:cond delay="0"/>
+                                          </p:stCondLst>
+                                        </p:cTn>
+                                        <p:tgtEl>
+                                          <p:spTgt spid="3">
+                                            <p:txEl>
+                                              <p:pRg st="2" end="2"/>
+                                            </p:txEl>
+                                          </p:spTgt>
+                                        </p:tgtEl>
+                                        <p:attrNameLst>
+                                          <p:attrName>style.visibility</p:attrName>
+                                        </p:attrNameLst>
+                                      </p:cBhvr>
+                                      <p:to>
+                                        <p:strVal val="visible"/>
+                                      </p:to>
+                                    </p:set>
+                                  </p:childTnLst>
+                                </p:cTn>
+                              </p:par>
+                            </p:childTnLst>
+                          </p:cTn>
+                        </p:par>
+                      </p:childTnLst>
+                    </p:cTn>
+                  </p:par>
+                  <p:par>
+                    <p:cTn id="15" fill="hold">
+                      <p:stCondLst>
+                        <p:cond delay="indefinite"/>
+                      </p:stCondLst>
+                      <p:childTnLst>
+                        <p:par>
+                          <p:cTn id="16" fill="hold">
+                            <p:stCondLst>
+                              <p:cond delay="0"/>
+                            </p:stCondLst>
+                            <p:childTnLst>
+                              <p:par>
+                                <p:cTn id="17" presetID="1" presetClass="entr" presetSubtype="0" fill="hold" grpId="0" nodeType="clickEffect">
+                                  <p:stCondLst>
+                                    <p:cond delay="0"/>
+                                  </p:stCondLst>
+                                  <p:childTnLst>
+                                    <p:set>
+                                      <p:cBhvr>
+                                        <p:cTn id="18" dur="1" fill="hold">
+                                          <p:stCondLst>
+                                            <p:cond delay="0"/>
+                                          </p:stCondLst>
+                                        </p:cTn>
+                                        <p:tgtEl>
+                                          <p:spTgt spid="3">
+                                            <p:txEl>
+                                              <p:pRg st="3" end="3"/>
+                                            </p:txEl>
+                                          </p:spTgt>
+                                        </p:tgtEl>
+                                        <p:attrNameLst>
+                                          <p:attrName>style.visibility</p:attrName>
+                                        </p:attrNameLst>
+                                      </p:cBhvr>
+                                      <p:to>
+                                        <p:strVal val="visible"/>
+                                      </p:to>
+                                    </p:set>
+                                  </p:childTnLst>
+                                </p:cTn>
+                              </p:par>
+                            </p:childTnLst>
+                          </p:cTn>
+                        </p:par>
+                      </p:childTnLst>
+                    </p:cTn>
+                  </p:par>
+                  <p:par>
+                    <p:cTn id="19" fill="hold">
+                      <p:stCondLst>
+                        <p:cond delay="indefinite"/>
+                      </p:stCondLst>
+                      <p:childTnLst>
+                        <p:par>
+                          <p:cTn id="20" fill="hold">
+                            <p:stCondLst>
+                              <p:cond delay="0"/>
+                            </p:stCondLst>
+                            <p:childTnLst>
+                              <p:par>
+                                <p:cTn id="21" presetID="1" presetClass="entr" presetSubtype="0" fill="hold" grpId="0" nodeType="clickEffect">
+                                  <p:stCondLst>
+                                    <p:cond delay="0"/>
+                                  </p:stCondLst>
+                                  <p:childTnLst>
+                                    <p:set>
+                                      <p:cBhvr>
+                                        <p:cTn id="22" dur="1" fill="hold">
+                                          <p:stCondLst>
+                                            <p:cond delay="0"/>
+                                          </p:stCondLst>
+                                        </p:cTn>
+                                        <p:tgtEl>
+                                          <p:spTgt spid="3">
+                                            <p:txEl>
+                                              <p:pRg st="4" end="4"/>
+                                            </p:txEl>
+                                          </p:spTgt>
+                                        </p:tgtEl>
+                                        <p:attrNameLst>
+                                          <p:attrName>style.visibility</p:attrName>
+                                        </p:attrNameLst>
+                                      </p:cBhvr>
+                                      <p:to>
+                                        <p:strVal val="visible"/>
+                                      </p:to>
+                                    </p:set>
+                                  </p:childTnLst>
+                                </p:cTn>
+                              </p:par>
+                            </p:childTnLst>
+                          </p:cTn>
+                        </p:par>
+                      </p:childTnLst>
+                    </p:cTn>
+                  </p:par>
+                  <p:par>
+                    <p:cTn id="23" fill="hold">
+                      <p:stCondLst>
+                        <p:cond delay="indefinite"/>
+                      </p:stCondLst>
+                      <p:childTnLst>
+                        <p:par>
+                          <p:cTn id="24" fill="hold">
+                            <p:stCondLst>
+                              <p:cond delay="0"/>
+                            </p:stCondLst>
+                            <p:childTnLst>
+                              <p:par>
+                                <p:cTn id="25" presetID="1" presetClass="entr" presetSubtype="0" fill="hold" grpId="0" nodeType="clickEffect">
+                                  <p:stCondLst>
+                                    <p:cond delay="0"/>
+                                  </p:stCondLst>
+                                  <p:childTnLst>
+                                    <p:set>
+                                      <p:cBhvr>
+                                        <p:cTn id="26" dur="1" fill="hold">
+                                          <p:stCondLst>
+                                            <p:cond delay="0"/>
+                                          </p:stCondLst>
+                                        </p:cTn>
+                                        <p:tgtEl>
+                                          <p:spTgt spid="3">
+                                            <p:txEl>
+                                              <p:pRg st="5" end="5"/>
+                                            </p:txEl>
+                                          </p:spTgt>
+                                        </p:tgtEl>
+                                        <p:attrNameLst>
+                                          <p:attrName>style.visibility</p:attrName>
+                                        </p:attrNameLst>
+                                      </p:cBhvr>
+                                      <p:to>
+                                        <p:strVal val="visible"/>
+                                      </p:to>
+                                    </p:set>
+                                  </p:childTnLst>
+                                </p:cTn>
+                              </p:par>
+                            </p:childTnLst>
+                          </p:cTn>
+                        </p:par>
+                      </p:childTnLst>
+                    </p:cTn>
+                  </p:par>
+                  <p:par>
+                    <p:cTn id="27" fill="hold">
+                      <p:stCondLst>
+                        <p:cond delay="indefinite"/>
+                      </p:stCondLst>
+                      <p:childTnLst>
+                        <p:par>
+                          <p:cTn id="28" fill="hold">
+                            <p:stCondLst>
+                              <p:cond delay="0"/>
+                            </p:stCondLst>
+                            <p:childTnLst>
+                              <p:par>
+                                <p:cTn id="29" presetID="1" presetClass="entr" presetSubtype="0" fill="hold" grpId="0" nodeType="clickEffect">
+                                  <p:stCondLst>
+                                    <p:cond delay="0"/>
+                                  </p:stCondLst>
+                                  <p:childTnLst>
+                                    <p:set>
+                                      <p:cBhvr>
+                                        <p:cTn id="30" dur="1" fill="hold">
+                                          <p:stCondLst>
+                                            <p:cond delay="0"/>
+                                          </p:stCondLst>
+                                        </p:cTn>
+                                        <p:tgtEl>
+                                          <p:spTgt spid="3">
+                                            <p:txEl>
+                                              <p:pRg st="6" end="6"/>
+                                            </p:txEl>
+                                          </p:spTgt>
+                                        </p:tgtEl>
+                                        <p:attrNameLst>
+                                          <p:attrName>style.visibility</p:attrName>
+                                        </p:attrNameLst>
+                                      </p:cBhvr>
+                                      <p:to>
+                                        <p:strVal val="visible"/>
+                                      </p:to>
+                                    </p:set>
+                                  </p:childTnLst>
+                                </p:cTn>
+                              </p:par>
+                            </p:childTnLst>
+                          </p:cTn>
+                        </p:par>
+                      </p:childTnLst>
+                    </p:cTn>
+                  </p:par>
+                </p:childTnLst>
+              </p:cTn>
+              <p:prevCondLst>
+                <p:cond evt="onPrev" delay="0">
+                  <p:tgtEl>
+                    <p:sldTgt/>
+                  </p:tgtEl>
+                </p:cond>
+              </p:prevCondLst>
+              <p:nextCondLst>
+                <p:cond evt="onNext" delay="0">
+                  <p:tgtEl>
+                    <p:sldTgt/>
+                  </p:tgtEl>
+                </p:cond>
+              </p:nextCondLst>
+            </p:seq>
+          </p:childTnLst>
+        </p:cTn>
       </p:par>
     </p:tnLst>
+    <p:bldLst>
+      <p:bldP spid="3" grpId="0" build="p"/>
+    </p:bldLst>
   </p:timing>
 </p:sld>
 </file>
@@ -13111,7 +13927,6 @@
               <a:rPr lang="fr-FR" dirty="0" smtClean="0"/>
               <a:t>:</a:t>
             </a:r>
-            <a:endParaRPr lang="fr-FR" dirty="0" smtClean="0"/>
           </a:p>
           <a:p>
             <a:pPr lvl="1"/>
@@ -13147,7 +13962,6 @@
               <a:rPr lang="fr-FR" dirty="0" smtClean="0"/>
               <a:t>?</a:t>
             </a:r>
-            <a:endParaRPr lang="fr-FR" dirty="0" smtClean="0"/>
           </a:p>
           <a:p>
             <a:pPr lvl="1"/>
@@ -13267,11 +14081,7 @@
             </a:r>
             <a:r>
               <a:rPr lang="fr-FR" dirty="0" smtClean="0"/>
-              <a:t> </a:t>
-            </a:r>
-            <a:r>
-              <a:rPr lang="fr-FR" dirty="0" smtClean="0"/>
-              <a:t>transportation </a:t>
+              <a:t> transportation </a:t>
             </a:r>
             <a:r>
               <a:rPr lang="fr-FR" dirty="0" err="1" smtClean="0"/>
@@ -13298,11 +14108,7 @@
             <a:pPr lvl="1"/>
             <a:r>
               <a:rPr lang="fr-FR" dirty="0" smtClean="0"/>
-              <a:t>T</a:t>
-            </a:r>
-            <a:r>
-              <a:rPr lang="fr-FR" dirty="0" smtClean="0"/>
-              <a:t>he </a:t>
+              <a:t>The </a:t>
             </a:r>
             <a:r>
               <a:rPr lang="en-US" dirty="0" smtClean="0"/>
@@ -13310,15 +14116,7 @@
             </a:r>
             <a:r>
               <a:rPr lang="fr-FR" dirty="0" smtClean="0"/>
-              <a:t> </a:t>
-            </a:r>
-            <a:r>
-              <a:rPr lang="fr-FR" dirty="0" smtClean="0"/>
-              <a:t>of public transport, </a:t>
-            </a:r>
-            <a:r>
-              <a:rPr lang="fr-FR" dirty="0" smtClean="0"/>
-              <a:t>network to serve a </a:t>
+              <a:t> of public transport, network to serve a </a:t>
             </a:r>
             <a:r>
               <a:rPr lang="fr-FR" dirty="0" err="1" smtClean="0"/>
@@ -13326,143 +14124,141 @@
             </a:r>
             <a:r>
               <a:rPr lang="fr-FR" dirty="0" smtClean="0"/>
-              <a:t> population.</a:t>
+              <a:t> population. </a:t>
+            </a:r>
+          </a:p>
+          <a:p>
+            <a:pPr lvl="1"/>
+            <a:r>
+              <a:rPr lang="en-US" dirty="0" smtClean="0"/>
+              <a:t>Suburban underserved areas </a:t>
+            </a:r>
+          </a:p>
+          <a:p>
+            <a:pPr lvl="1"/>
+            <a:r>
+              <a:rPr lang="en-US" dirty="0"/>
+              <a:t>T</a:t>
+            </a:r>
+            <a:r>
+              <a:rPr lang="en-US" dirty="0" smtClean="0"/>
+              <a:t>he </a:t>
+            </a:r>
+            <a:r>
+              <a:rPr lang="en-US" dirty="0"/>
+              <a:t>future of transport for a longer </a:t>
+            </a:r>
+            <a:r>
+              <a:rPr lang="en-US" dirty="0" smtClean="0"/>
+              <a:t>horizon</a:t>
+            </a:r>
+            <a:r>
+              <a:rPr lang="en-US" dirty="0"/>
+              <a:t> </a:t>
+            </a:r>
+            <a:r>
+              <a:rPr lang="en-US" dirty="0" smtClean="0"/>
+              <a:t>is 	</a:t>
+            </a:r>
+            <a:endParaRPr lang="en-US" dirty="0"/>
+          </a:p>
+          <a:p>
+            <a:pPr lvl="1"/>
+            <a:r>
+              <a:rPr lang="en-US" dirty="0" smtClean="0"/>
+              <a:t>There </a:t>
+            </a:r>
+            <a:r>
+              <a:rPr lang="en-US" dirty="0"/>
+              <a:t>is a clear aim in the EU to make </a:t>
+            </a:r>
+            <a:r>
+              <a:rPr lang="en-US" dirty="0" smtClean="0"/>
+              <a:t>the multimodal passenger transport </a:t>
+            </a:r>
+            <a:r>
+              <a:rPr lang="en-US" dirty="0"/>
+              <a:t>as seamless as </a:t>
+            </a:r>
+            <a:r>
+              <a:rPr lang="en-US" dirty="0" smtClean="0"/>
+              <a:t>possible.</a:t>
+            </a:r>
+            <a:endParaRPr lang="en-US" dirty="0"/>
+          </a:p>
+          <a:p>
+            <a:pPr lvl="1"/>
+            <a:r>
+              <a:rPr lang="en-US" dirty="0"/>
+              <a:t>If successfully implemented intermodal passenger transport will give more options to the </a:t>
+            </a:r>
+            <a:r>
+              <a:rPr lang="en-US" dirty="0" smtClean="0"/>
+              <a:t>traveler.</a:t>
+            </a:r>
+          </a:p>
+          <a:p>
+            <a:r>
+              <a:rPr lang="fr-FR" dirty="0" smtClean="0"/>
+              <a:t>Objectives:</a:t>
+            </a:r>
+          </a:p>
+          <a:p>
+            <a:pPr lvl="1"/>
+            <a:r>
+              <a:rPr lang="fr-FR" dirty="0" err="1" smtClean="0"/>
+              <a:t>Understand</a:t>
+            </a:r>
+            <a:r>
+              <a:rPr lang="fr-FR" dirty="0" smtClean="0"/>
+              <a:t> transportation science and </a:t>
+            </a:r>
+            <a:r>
+              <a:rPr lang="fr-FR" dirty="0" err="1" smtClean="0"/>
+              <a:t>modeling</a:t>
+            </a:r>
+            <a:r>
+              <a:rPr lang="fr-FR" dirty="0" smtClean="0"/>
+              <a:t> of </a:t>
+            </a:r>
+            <a:r>
+              <a:rPr lang="fr-FR" dirty="0" err="1" smtClean="0"/>
+              <a:t>passenger</a:t>
+            </a:r>
+            <a:r>
+              <a:rPr lang="fr-FR" dirty="0" smtClean="0"/>
+              <a:t> transport </a:t>
+            </a:r>
+            <a:r>
+              <a:rPr lang="fr-FR" dirty="0" err="1" smtClean="0"/>
+              <a:t>systems</a:t>
+            </a:r>
+            <a:r>
+              <a:rPr lang="fr-FR" dirty="0" smtClean="0"/>
+              <a:t>.</a:t>
+            </a:r>
+          </a:p>
+          <a:p>
+            <a:pPr lvl="1"/>
+            <a:r>
+              <a:rPr lang="fr-FR" dirty="0" err="1"/>
+              <a:t>Establish</a:t>
+            </a:r>
+            <a:r>
+              <a:rPr lang="fr-FR" dirty="0"/>
+              <a:t> a </a:t>
+            </a:r>
+            <a:r>
+              <a:rPr lang="fr-FR" dirty="0" err="1" smtClean="0"/>
+              <a:t>framework</a:t>
             </a:r>
             <a:r>
               <a:rPr lang="fr-FR" dirty="0" smtClean="0"/>
               <a:t> </a:t>
             </a:r>
-          </a:p>
-          <a:p>
-            <a:pPr lvl="1"/>
-            <a:r>
-              <a:rPr lang="en-US" dirty="0" smtClean="0"/>
-              <a:t>Suburban underserved areas </a:t>
-            </a:r>
-          </a:p>
-          <a:p>
-            <a:pPr lvl="1"/>
-            <a:r>
-              <a:rPr lang="en-US" dirty="0"/>
-              <a:t>T</a:t>
-            </a:r>
-            <a:r>
-              <a:rPr lang="en-US" dirty="0" smtClean="0"/>
-              <a:t>he </a:t>
-            </a:r>
-            <a:r>
-              <a:rPr lang="en-US" dirty="0"/>
-              <a:t>future of transport for a longer </a:t>
-            </a:r>
-            <a:r>
-              <a:rPr lang="en-US" dirty="0" smtClean="0"/>
-              <a:t>horizon</a:t>
-            </a:r>
-            <a:r>
-              <a:rPr lang="en-US" dirty="0"/>
-              <a:t> </a:t>
-            </a:r>
-            <a:r>
-              <a:rPr lang="en-US" dirty="0" smtClean="0"/>
-              <a:t>is </a:t>
-            </a:r>
-            <a:r>
-              <a:rPr lang="en-US" dirty="0" smtClean="0"/>
-              <a:t>	</a:t>
-            </a:r>
-            <a:endParaRPr lang="en-US" dirty="0"/>
-          </a:p>
-          <a:p>
-            <a:pPr lvl="1"/>
-            <a:r>
-              <a:rPr lang="en-US" dirty="0" smtClean="0"/>
-              <a:t>There </a:t>
-            </a:r>
-            <a:r>
-              <a:rPr lang="en-US" dirty="0"/>
-              <a:t>is a clear aim in the EU to make </a:t>
-            </a:r>
-            <a:r>
-              <a:rPr lang="en-US" dirty="0" smtClean="0"/>
-              <a:t>the multimodal passenger transport </a:t>
-            </a:r>
-            <a:r>
-              <a:rPr lang="en-US" dirty="0"/>
-              <a:t>as seamless as </a:t>
-            </a:r>
-            <a:r>
-              <a:rPr lang="en-US" dirty="0" smtClean="0"/>
-              <a:t>possible.</a:t>
-            </a:r>
-            <a:endParaRPr lang="en-US" dirty="0"/>
-          </a:p>
-          <a:p>
-            <a:pPr lvl="1"/>
-            <a:r>
-              <a:rPr lang="en-US" dirty="0"/>
-              <a:t>If successfully implemented intermodal passenger transport will give more options to the </a:t>
-            </a:r>
-            <a:r>
-              <a:rPr lang="en-US" dirty="0" smtClean="0"/>
-              <a:t>traveler.</a:t>
-            </a:r>
-            <a:endParaRPr lang="en-US" dirty="0" smtClean="0"/>
-          </a:p>
-          <a:p>
-            <a:r>
-              <a:rPr lang="fr-FR" dirty="0" smtClean="0"/>
-              <a:t>Objectives:</a:t>
-            </a:r>
-          </a:p>
-          <a:p>
-            <a:pPr lvl="1"/>
             <a:r>
               <a:rPr lang="fr-FR" dirty="0" err="1" smtClean="0"/>
-              <a:t>Understand</a:t>
-            </a:r>
-            <a:r>
-              <a:rPr lang="fr-FR" dirty="0" smtClean="0"/>
-              <a:t> transportation science and </a:t>
-            </a:r>
-            <a:r>
-              <a:rPr lang="fr-FR" dirty="0" err="1" smtClean="0"/>
-              <a:t>modeling</a:t>
-            </a:r>
-            <a:r>
-              <a:rPr lang="fr-FR" dirty="0" smtClean="0"/>
-              <a:t> of </a:t>
-            </a:r>
-            <a:r>
-              <a:rPr lang="fr-FR" dirty="0" err="1" smtClean="0"/>
-              <a:t>passenger</a:t>
-            </a:r>
-            <a:r>
-              <a:rPr lang="fr-FR" dirty="0" smtClean="0"/>
-              <a:t> transport </a:t>
-            </a:r>
-            <a:r>
-              <a:rPr lang="fr-FR" dirty="0" err="1" smtClean="0"/>
-              <a:t>systems</a:t>
-            </a:r>
-            <a:r>
-              <a:rPr lang="fr-FR" dirty="0" smtClean="0"/>
-              <a:t>.</a:t>
-            </a:r>
-            <a:endParaRPr lang="fr-FR" dirty="0" smtClean="0"/>
-          </a:p>
-          <a:p>
-            <a:pPr lvl="1"/>
-            <a:r>
-              <a:rPr lang="fr-FR" dirty="0" err="1"/>
-              <a:t>Establish</a:t>
-            </a:r>
-            <a:r>
-              <a:rPr lang="fr-FR" dirty="0"/>
-              <a:t> a </a:t>
-            </a:r>
-            <a:r>
-              <a:rPr lang="fr-FR" dirty="0" err="1" smtClean="0"/>
-              <a:t>framework</a:t>
+              <a:t>that</a:t>
             </a:r>
             <a:r>
               <a:rPr lang="fr-FR" dirty="0" smtClean="0"/>
@@ -13470,7 +14266,7 @@
             </a:r>
             <a:r>
               <a:rPr lang="fr-FR" dirty="0" err="1" smtClean="0"/>
-              <a:t>that</a:t>
+              <a:t>connects</a:t>
             </a:r>
             <a:r>
               <a:rPr lang="fr-FR" dirty="0" smtClean="0"/>
@@ -13478,7 +14274,7 @@
             </a:r>
             <a:r>
               <a:rPr lang="fr-FR" dirty="0" err="1" smtClean="0"/>
-              <a:t>connects</a:t>
+              <a:t>shared</a:t>
             </a:r>
             <a:r>
               <a:rPr lang="fr-FR" dirty="0" smtClean="0"/>
@@ -13486,7 +14282,7 @@
             </a:r>
             <a:r>
               <a:rPr lang="fr-FR" dirty="0" err="1" smtClean="0"/>
-              <a:t>shared</a:t>
+              <a:t>mobility</a:t>
             </a:r>
             <a:r>
               <a:rPr lang="fr-FR" dirty="0" smtClean="0"/>
@@ -13494,7 +14290,7 @@
             </a:r>
             <a:r>
               <a:rPr lang="fr-FR" dirty="0" err="1" smtClean="0"/>
-              <a:t>mobility</a:t>
+              <a:t>with</a:t>
             </a:r>
             <a:r>
               <a:rPr lang="fr-FR" dirty="0" smtClean="0"/>
@@ -13502,14 +14298,6 @@
             </a:r>
             <a:r>
               <a:rPr lang="fr-FR" dirty="0" err="1" smtClean="0"/>
-              <a:t>with</a:t>
-            </a:r>
-            <a:r>
-              <a:rPr lang="fr-FR" dirty="0" smtClean="0"/>
-              <a:t> </a:t>
-            </a:r>
-            <a:r>
-              <a:rPr lang="fr-FR" dirty="0" err="1" smtClean="0"/>
               <a:t>classical</a:t>
             </a:r>
             <a:r>
@@ -13541,7 +14329,7 @@
           <a:p>
             <a:fld id="{23200991-7F44-467B-BB23-8ECD9633CB0D}" type="datetime1">
               <a:rPr lang="fr-FR" smtClean="0"/>
-              <a:t>11/06/2020</a:t>
+              <a:t>12/06/2020</a:t>
             </a:fld>
             <a:endParaRPr lang="fr-FR"/>
           </a:p>
@@ -14197,22 +14985,22 @@
           <a:lstStyle/>
           <a:p>
             <a:r>
-              <a:rPr lang="fr-FR" dirty="0" smtClean="0"/>
-              <a:t>The contribution of </a:t>
-            </a:r>
-            <a:r>
-              <a:rPr lang="fr-FR" dirty="0" err="1" smtClean="0"/>
-              <a:t>this</a:t>
-            </a:r>
-            <a:r>
-              <a:rPr lang="fr-FR" dirty="0" smtClean="0"/>
+              <a:rPr lang="fr-FR" b="1" dirty="0" err="1" smtClean="0"/>
+              <a:t>Next</a:t>
+            </a:r>
+            <a:r>
+              <a:rPr lang="fr-FR" b="1" dirty="0" smtClean="0"/>
               <a:t> </a:t>
             </a:r>
             <a:r>
-              <a:rPr lang="fr-FR" dirty="0" err="1" smtClean="0"/>
-              <a:t>project</a:t>
-            </a:r>
-            <a:endParaRPr lang="fr-FR" dirty="0"/>
+              <a:rPr lang="fr-FR" b="1" dirty="0" err="1" smtClean="0"/>
+              <a:t>steps</a:t>
+            </a:r>
+            <a:r>
+              <a:rPr lang="fr-FR" b="1" dirty="0" smtClean="0"/>
+              <a:t>:</a:t>
+            </a:r>
+            <a:endParaRPr lang="fr-FR" b="1" dirty="0"/>
           </a:p>
         </p:txBody>
       </p:sp>
@@ -14234,25 +15022,166 @@
         </p:spPr>
         <p:txBody>
           <a:bodyPr>
-            <a:normAutofit fontScale="85000" lnSpcReduction="20000"/>
+            <a:normAutofit/>
           </a:bodyPr>
           <a:lstStyle/>
           <a:p>
             <a:r>
+              <a:rPr lang="en-US" dirty="0" smtClean="0"/>
+              <a:t>Create </a:t>
+            </a:r>
+            <a:r>
+              <a:rPr lang="en-US" dirty="0"/>
+              <a:t>a mathematical formulation for the whole </a:t>
+            </a:r>
+            <a:r>
+              <a:rPr lang="en-US" dirty="0" smtClean="0"/>
+              <a:t>model.</a:t>
+            </a:r>
+            <a:endParaRPr lang="fr-FR" dirty="0" smtClean="0"/>
+          </a:p>
+          <a:p>
+            <a:r>
+              <a:rPr lang="en-US" dirty="0" smtClean="0"/>
+              <a:t>Optimize </a:t>
+            </a:r>
+            <a:r>
+              <a:rPr lang="en-US" dirty="0"/>
+              <a:t>the whole model (instead of dividing it into two part) </a:t>
+            </a:r>
+            <a:r>
+              <a:rPr lang="en-US" dirty="0" smtClean="0"/>
+              <a:t>and </a:t>
+            </a:r>
+            <a:r>
               <a:rPr lang="fr-FR" dirty="0" smtClean="0"/>
-              <a:t>The state of the art a </a:t>
+              <a:t>compare </a:t>
             </a:r>
             <a:r>
               <a:rPr lang="fr-FR" dirty="0" err="1" smtClean="0"/>
-              <a:t>bibliographic</a:t>
+              <a:t>results</a:t>
+            </a:r>
+            <a:r>
+              <a:rPr lang="fr-FR" dirty="0" smtClean="0"/>
+              <a:t>.</a:t>
+            </a:r>
+            <a:endParaRPr lang="fr-FR" dirty="0" smtClean="0"/>
+          </a:p>
+          <a:p>
+            <a:r>
+              <a:rPr lang="en-US" dirty="0"/>
+              <a:t>Create user </a:t>
+            </a:r>
+            <a:r>
+              <a:rPr lang="en-US" dirty="0" smtClean="0"/>
+              <a:t>profiles </a:t>
+            </a:r>
+            <a:r>
+              <a:rPr lang="en-US" dirty="0"/>
+              <a:t>for daily commuters to optimize </a:t>
+            </a:r>
+            <a:r>
+              <a:rPr lang="en-US" dirty="0" smtClean="0"/>
+              <a:t>routing.</a:t>
+            </a:r>
+            <a:endParaRPr lang="en-US" dirty="0" smtClean="0"/>
+          </a:p>
+          <a:p>
+            <a:r>
+              <a:rPr lang="en-US" dirty="0"/>
+              <a:t>Merge real-time booking with prearranged booking</a:t>
+            </a:r>
+            <a:r>
+              <a:rPr lang="en-US" dirty="0" smtClean="0"/>
+              <a:t>.</a:t>
+            </a:r>
+          </a:p>
+          <a:p>
+            <a:r>
+              <a:rPr lang="en-US" dirty="0"/>
+              <a:t>A framework of ride-sharing algorithms to build the most </a:t>
+            </a:r>
+            <a:r>
+              <a:rPr lang="en-US" dirty="0" smtClean="0"/>
+              <a:t>efficient public </a:t>
+            </a:r>
+            <a:r>
+              <a:rPr lang="fr-FR" dirty="0" smtClean="0"/>
+              <a:t>transport </a:t>
+            </a:r>
+            <a:r>
+              <a:rPr lang="fr-FR" dirty="0"/>
+              <a:t>feeder</a:t>
+            </a:r>
+            <a:r>
+              <a:rPr lang="fr-FR" dirty="0" smtClean="0"/>
+              <a:t>.</a:t>
+            </a:r>
+          </a:p>
+          <a:p>
+            <a:r>
+              <a:rPr lang="en-US" dirty="0"/>
+              <a:t>Put constraints on pickup stations to be open on </a:t>
+            </a:r>
+            <a:r>
+              <a:rPr lang="en-US" dirty="0" smtClean="0"/>
+              <a:t>specific </a:t>
+            </a:r>
+            <a:r>
+              <a:rPr lang="en-US" dirty="0"/>
+              <a:t>areas </a:t>
+            </a:r>
+            <a:r>
+              <a:rPr lang="en-US" dirty="0" smtClean="0"/>
+              <a:t>where </a:t>
+            </a:r>
+            <a:r>
+              <a:rPr lang="fr-FR" dirty="0" err="1" smtClean="0"/>
+              <a:t>there</a:t>
             </a:r>
             <a:r>
               <a:rPr lang="fr-FR" dirty="0" smtClean="0"/>
               <a:t> </a:t>
             </a:r>
             <a:r>
+              <a:rPr lang="fr-FR" dirty="0"/>
+              <a:t>are no obstacles</a:t>
+            </a:r>
+            <a:r>
+              <a:rPr lang="fr-FR" dirty="0" smtClean="0"/>
+              <a:t>.</a:t>
+            </a:r>
+          </a:p>
+          <a:p>
+            <a:r>
               <a:rPr lang="fr-FR" dirty="0" err="1" smtClean="0"/>
-              <a:t>research</a:t>
+              <a:t>Include</a:t>
+            </a:r>
+            <a:r>
+              <a:rPr lang="fr-FR" dirty="0" smtClean="0"/>
+              <a:t> real </a:t>
+            </a:r>
+            <a:r>
+              <a:rPr lang="fr-FR" dirty="0" err="1" smtClean="0"/>
+              <a:t>geographic</a:t>
+            </a:r>
+            <a:r>
+              <a:rPr lang="fr-FR" dirty="0" smtClean="0"/>
+              <a:t> locations and use real </a:t>
+            </a:r>
+            <a:r>
+              <a:rPr lang="fr-FR" dirty="0" err="1" smtClean="0"/>
+              <a:t>routing</a:t>
+            </a:r>
+            <a:r>
+              <a:rPr lang="fr-FR" dirty="0" smtClean="0"/>
+              <a:t> data.</a:t>
+            </a:r>
+          </a:p>
+          <a:p>
+            <a:r>
+              <a:rPr lang="fr-FR" dirty="0" err="1" smtClean="0"/>
+              <a:t>Add</a:t>
             </a:r>
             <a:r>
               <a:rPr lang="fr-FR" dirty="0" smtClean="0"/>
@@ -14260,199 +15189,11 @@
             </a:r>
             <a:r>
               <a:rPr lang="fr-FR" dirty="0" err="1" smtClean="0"/>
-              <a:t>amazing</a:t>
+              <a:t>constraints</a:t>
             </a:r>
             <a:r>
               <a:rPr lang="fr-FR" dirty="0" smtClean="0"/>
-              <a:t> </a:t>
-            </a:r>
-            <a:r>
-              <a:rPr lang="fr-FR" dirty="0" err="1" smtClean="0"/>
-              <a:t>endeavor</a:t>
-            </a:r>
-            <a:endParaRPr lang="fr-FR" dirty="0" smtClean="0"/>
-          </a:p>
-          <a:p>
-            <a:r>
-              <a:rPr lang="en-US" dirty="0"/>
-              <a:t>I presented a case studies </a:t>
-            </a:r>
-            <a:r>
-              <a:rPr lang="en-US" dirty="0" smtClean="0"/>
-              <a:t>analyzing </a:t>
-            </a:r>
-            <a:r>
-              <a:rPr lang="en-US" dirty="0"/>
-              <a:t>shared mobility system </a:t>
-            </a:r>
-            <a:r>
-              <a:rPr lang="en-US" dirty="0" smtClean="0"/>
-              <a:t>performances or </a:t>
-            </a:r>
-            <a:r>
-              <a:rPr lang="en-US" dirty="0"/>
-              <a:t>studying their potential impacts on people's lives and their </a:t>
-            </a:r>
-            <a:r>
-              <a:rPr lang="en-US" dirty="0" smtClean="0"/>
-              <a:t>daily commutes </a:t>
-            </a:r>
-            <a:r>
-              <a:rPr lang="en-US" dirty="0"/>
-              <a:t>if we optimized the DARP to feed the public transport system</a:t>
-            </a:r>
-            <a:r>
-              <a:rPr lang="en-US" dirty="0" smtClean="0"/>
-              <a:t>.</a:t>
-            </a:r>
-          </a:p>
-          <a:p>
-            <a:r>
-              <a:rPr lang="en-US" dirty="0"/>
-              <a:t>Thanks to this rich bibliography I am now able to identify </a:t>
-            </a:r>
-            <a:r>
-              <a:rPr lang="en-US" dirty="0" smtClean="0"/>
-              <a:t>the relevancy </a:t>
-            </a:r>
-            <a:r>
-              <a:rPr lang="en-US" dirty="0"/>
-              <a:t>of </a:t>
-            </a:r>
-            <a:r>
-              <a:rPr lang="en-US" dirty="0" err="1"/>
-              <a:t>scientic</a:t>
-            </a:r>
-            <a:r>
-              <a:rPr lang="en-US" dirty="0"/>
-              <a:t> papers on a much higher pace</a:t>
-            </a:r>
-            <a:r>
-              <a:rPr lang="en-US" dirty="0" smtClean="0"/>
-              <a:t>.</a:t>
-            </a:r>
-          </a:p>
-          <a:p>
-            <a:r>
-              <a:rPr lang="fr-FR" dirty="0" err="1" smtClean="0"/>
-              <a:t>Programming</a:t>
-            </a:r>
-            <a:r>
-              <a:rPr lang="fr-FR" dirty="0" smtClean="0"/>
-              <a:t> </a:t>
-            </a:r>
-            <a:r>
-              <a:rPr lang="fr-FR" dirty="0" err="1" smtClean="0"/>
-              <a:t>Skills</a:t>
-            </a:r>
-            <a:endParaRPr lang="fr-FR" dirty="0"/>
-          </a:p>
-          <a:p>
-            <a:r>
-              <a:rPr lang="en-US" dirty="0"/>
-              <a:t>In the state of the art section I showed the </a:t>
-            </a:r>
-            <a:r>
-              <a:rPr lang="en-US" dirty="0" smtClean="0"/>
-              <a:t>connection in literature </a:t>
-            </a:r>
-            <a:r>
-              <a:rPr lang="en-US" dirty="0"/>
-              <a:t>between public </a:t>
-            </a:r>
-            <a:r>
-              <a:rPr lang="en-US" dirty="0" smtClean="0"/>
-              <a:t>transport </a:t>
-            </a:r>
-            <a:r>
-              <a:rPr lang="fr-FR" dirty="0" smtClean="0"/>
-              <a:t>and </a:t>
-            </a:r>
-            <a:r>
-              <a:rPr lang="fr-FR" dirty="0" err="1"/>
-              <a:t>shared</a:t>
-            </a:r>
-            <a:r>
-              <a:rPr lang="fr-FR" dirty="0"/>
-              <a:t> </a:t>
-            </a:r>
-            <a:r>
-              <a:rPr lang="fr-FR" dirty="0" err="1" smtClean="0"/>
-              <a:t>mobility</a:t>
-            </a:r>
-            <a:endParaRPr lang="fr-FR" dirty="0" smtClean="0"/>
-          </a:p>
-          <a:p>
-            <a:r>
-              <a:rPr lang="en-US" dirty="0"/>
-              <a:t>I showed how can the DAR problem be reformulated to answer to the </a:t>
-            </a:r>
-            <a:r>
-              <a:rPr lang="en-US" dirty="0" smtClean="0"/>
-              <a:t>gap </a:t>
-            </a:r>
-            <a:r>
-              <a:rPr lang="fr-FR" dirty="0" err="1" smtClean="0"/>
-              <a:t>that</a:t>
-            </a:r>
-            <a:r>
-              <a:rPr lang="fr-FR" dirty="0" smtClean="0"/>
-              <a:t> </a:t>
-            </a:r>
-            <a:r>
-              <a:rPr lang="fr-FR" dirty="0" err="1"/>
-              <a:t>currently</a:t>
-            </a:r>
-            <a:r>
-              <a:rPr lang="fr-FR" dirty="0"/>
-              <a:t> </a:t>
-            </a:r>
-            <a:r>
-              <a:rPr lang="fr-FR" dirty="0" err="1" smtClean="0"/>
-              <a:t>exists</a:t>
-            </a:r>
-            <a:endParaRPr lang="fr-FR" dirty="0" smtClean="0"/>
-          </a:p>
-          <a:p>
-            <a:r>
-              <a:rPr lang="en-US" dirty="0" smtClean="0"/>
-              <a:t>I gained confidence &amp; motivation </a:t>
-            </a:r>
-            <a:r>
-              <a:rPr lang="en-US" dirty="0"/>
-              <a:t>to continue in this research</a:t>
-            </a:r>
-            <a:r>
-              <a:rPr lang="en-US" dirty="0" smtClean="0"/>
-              <a:t>.</a:t>
-            </a:r>
-          </a:p>
-          <a:p>
-            <a:r>
-              <a:rPr lang="en-US" dirty="0" smtClean="0"/>
-              <a:t>In the second part of the process, I learned a lot </a:t>
-            </a:r>
-          </a:p>
-          <a:p>
-            <a:r>
-              <a:rPr lang="en-US" dirty="0"/>
-              <a:t>With the latest trends to research deploying new </a:t>
-            </a:r>
-            <a:r>
-              <a:rPr lang="en-US" dirty="0" smtClean="0"/>
-              <a:t>autonomous mobility </a:t>
-            </a:r>
-            <a:r>
-              <a:rPr lang="en-US" dirty="0"/>
-              <a:t>services, inter-modality become more attractive. And there is also </a:t>
-            </a:r>
-            <a:r>
-              <a:rPr lang="en-US" dirty="0" smtClean="0"/>
-              <a:t>a need </a:t>
-            </a:r>
-            <a:r>
-              <a:rPr lang="en-US" dirty="0"/>
-              <a:t>to introduce new models and algorithms.</a:t>
+              <a:t> to the location of pickup stations</a:t>
             </a:r>
             <a:endParaRPr lang="fr-FR" dirty="0" smtClean="0"/>
           </a:p>
@@ -14476,9 +15217,9 @@
           <a:bodyPr/>
           <a:lstStyle/>
           <a:p>
-            <a:fld id="{F17915BF-AA20-4B83-BAD9-5FAEB744B471}" type="datetime1">
+            <a:fld id="{00BE4C9A-503E-44A1-BB10-CBEF238A28BC}" type="datetime1">
               <a:rPr lang="fr-FR" smtClean="0"/>
-              <a:t>11/06/2020</a:t>
+              <a:t>12/06/2020</a:t>
             </a:fld>
             <a:endParaRPr lang="fr-FR"/>
           </a:p>
@@ -14525,337 +15266,6 @@
             <a:fld id="{DA3876A1-FE05-45B1-8F8C-6A5E69C2C81A}" type="slidenum">
               <a:rPr lang="fr-FR" smtClean="0"/>
               <a:t>30</a:t>
-            </a:fld>
-            <a:endParaRPr lang="fr-FR"/>
-          </a:p>
-        </p:txBody>
-      </p:sp>
-      <p:pic>
-        <p:nvPicPr>
-          <p:cNvPr id="7" name="Image 6"/>
-          <p:cNvPicPr>
-            <a:picLocks noChangeAspect="1"/>
-          </p:cNvPicPr>
-          <p:nvPr/>
-        </p:nvPicPr>
-        <p:blipFill>
-          <a:blip r:embed="rId2" cstate="print">
-            <a:extLst>
-              <a:ext uri="{28A0092B-C50C-407E-A947-70E740481C1C}">
-                <a14:useLocalDpi xmlns:a14="http://schemas.microsoft.com/office/drawing/2010/main" val="0"/>
-              </a:ext>
-            </a:extLst>
-          </a:blip>
-          <a:stretch>
-            <a:fillRect/>
-          </a:stretch>
-        </p:blipFill>
-        <p:spPr>
-          <a:xfrm>
-            <a:off x="9497704" y="0"/>
-            <a:ext cx="2694296" cy="788635"/>
-          </a:xfrm>
-          <a:prstGeom prst="rect">
-            <a:avLst/>
-          </a:prstGeom>
-        </p:spPr>
-      </p:pic>
-    </p:spTree>
-    <p:extLst>
-      <p:ext uri="{BB962C8B-B14F-4D97-AF65-F5344CB8AC3E}">
-        <p14:creationId xmlns:p14="http://schemas.microsoft.com/office/powerpoint/2010/main" val="2967258286"/>
-      </p:ext>
-    </p:extLst>
-  </p:cSld>
-  <p:clrMapOvr>
-    <a:masterClrMapping/>
-  </p:clrMapOvr>
-  <p:timing>
-    <p:tnLst>
-      <p:par>
-        <p:cTn id="1" dur="indefinite" restart="never" nodeType="tmRoot"/>
-      </p:par>
-    </p:tnLst>
-  </p:timing>
-</p:sld>
-</file>
-
-<file path=ppt/slides/slide31.xml><?xml version="1.0" encoding="utf-8"?>
-<p:sld xmlns:a="http://schemas.openxmlformats.org/drawingml/2006/main" xmlns:r="http://schemas.openxmlformats.org/officeDocument/2006/relationships" xmlns:p="http://schemas.openxmlformats.org/presentationml/2006/main">
-  <p:cSld>
-    <p:spTree>
-      <p:nvGrpSpPr>
-        <p:cNvPr id="1" name=""/>
-        <p:cNvGrpSpPr/>
-        <p:nvPr/>
-      </p:nvGrpSpPr>
-      <p:grpSpPr>
-        <a:xfrm>
-          <a:off x="0" y="0"/>
-          <a:ext cx="0" cy="0"/>
-          <a:chOff x="0" y="0"/>
-          <a:chExt cx="0" cy="0"/>
-        </a:xfrm>
-      </p:grpSpPr>
-      <p:sp>
-        <p:nvSpPr>
-          <p:cNvPr id="2" name="Titre 1"/>
-          <p:cNvSpPr>
-            <a:spLocks noGrp="1"/>
-          </p:cNvSpPr>
-          <p:nvPr>
-            <p:ph type="title"/>
-          </p:nvPr>
-        </p:nvSpPr>
-        <p:spPr>
-          <a:xfrm>
-            <a:off x="838200" y="365125"/>
-            <a:ext cx="10515600" cy="576571"/>
-          </a:xfrm>
-        </p:spPr>
-        <p:txBody>
-          <a:bodyPr>
-            <a:normAutofit fontScale="90000"/>
-          </a:bodyPr>
-          <a:lstStyle/>
-          <a:p>
-            <a:r>
-              <a:rPr lang="fr-FR" b="1" dirty="0" err="1" smtClean="0"/>
-              <a:t>Next</a:t>
-            </a:r>
-            <a:r>
-              <a:rPr lang="fr-FR" b="1" dirty="0" smtClean="0"/>
-              <a:t> </a:t>
-            </a:r>
-            <a:r>
-              <a:rPr lang="fr-FR" b="1" dirty="0" err="1" smtClean="0"/>
-              <a:t>steps</a:t>
-            </a:r>
-            <a:r>
-              <a:rPr lang="fr-FR" b="1" dirty="0" smtClean="0"/>
-              <a:t>:</a:t>
-            </a:r>
-            <a:endParaRPr lang="fr-FR" b="1" dirty="0"/>
-          </a:p>
-        </p:txBody>
-      </p:sp>
-      <p:sp>
-        <p:nvSpPr>
-          <p:cNvPr id="3" name="Espace réservé du contenu 2"/>
-          <p:cNvSpPr>
-            <a:spLocks noGrp="1"/>
-          </p:cNvSpPr>
-          <p:nvPr>
-            <p:ph idx="1"/>
-          </p:nvPr>
-        </p:nvSpPr>
-        <p:spPr>
-          <a:xfrm>
-            <a:off x="838200" y="941696"/>
-            <a:ext cx="10515600" cy="5235267"/>
-          </a:xfrm>
-        </p:spPr>
-        <p:txBody>
-          <a:bodyPr>
-            <a:normAutofit/>
-          </a:bodyPr>
-          <a:lstStyle/>
-          <a:p>
-            <a:r>
-              <a:rPr lang="en-US" dirty="0" smtClean="0"/>
-              <a:t>Factorize and optimize</a:t>
-            </a:r>
-          </a:p>
-          <a:p>
-            <a:r>
-              <a:rPr lang="en-US" dirty="0" smtClean="0"/>
-              <a:t>Create </a:t>
-            </a:r>
-            <a:r>
-              <a:rPr lang="en-US" dirty="0"/>
-              <a:t>a mathematical formulation for the whole model</a:t>
-            </a:r>
-            <a:endParaRPr lang="fr-FR" dirty="0" smtClean="0"/>
-          </a:p>
-          <a:p>
-            <a:r>
-              <a:rPr lang="fr-FR" dirty="0" err="1" smtClean="0"/>
-              <a:t>Create</a:t>
-            </a:r>
-            <a:r>
-              <a:rPr lang="fr-FR" dirty="0" smtClean="0"/>
-              <a:t> profiles for trips on </a:t>
-            </a:r>
-            <a:r>
-              <a:rPr lang="fr-FR" dirty="0" err="1" smtClean="0"/>
-              <a:t>repition</a:t>
-            </a:r>
-            <a:endParaRPr lang="fr-FR" dirty="0" smtClean="0"/>
-          </a:p>
-          <a:p>
-            <a:r>
-              <a:rPr lang="en-US" dirty="0"/>
-              <a:t>Optimize the whole model (instead of dividing it into two part) </a:t>
-            </a:r>
-            <a:r>
-              <a:rPr lang="en-US" dirty="0" smtClean="0"/>
-              <a:t>and </a:t>
-            </a:r>
-            <a:r>
-              <a:rPr lang="fr-FR" dirty="0" smtClean="0"/>
-              <a:t>compare </a:t>
-            </a:r>
-            <a:r>
-              <a:rPr lang="fr-FR" dirty="0" err="1" smtClean="0"/>
-              <a:t>results</a:t>
-            </a:r>
-            <a:endParaRPr lang="fr-FR" dirty="0" smtClean="0"/>
-          </a:p>
-          <a:p>
-            <a:r>
-              <a:rPr lang="en-US" dirty="0"/>
-              <a:t>Create user proles for daily commuters to optimize </a:t>
-            </a:r>
-            <a:r>
-              <a:rPr lang="en-US" dirty="0" smtClean="0"/>
-              <a:t>routing</a:t>
-            </a:r>
-          </a:p>
-          <a:p>
-            <a:r>
-              <a:rPr lang="en-US" dirty="0"/>
-              <a:t>Merge real-time booking with prearranged booking</a:t>
-            </a:r>
-            <a:r>
-              <a:rPr lang="en-US" dirty="0" smtClean="0"/>
-              <a:t>.</a:t>
-            </a:r>
-          </a:p>
-          <a:p>
-            <a:r>
-              <a:rPr lang="en-US" dirty="0"/>
-              <a:t>A framework of ride-sharing algorithms to build the most </a:t>
-            </a:r>
-            <a:r>
-              <a:rPr lang="en-US" dirty="0" smtClean="0"/>
-              <a:t>efficient public </a:t>
-            </a:r>
-            <a:r>
-              <a:rPr lang="fr-FR" dirty="0" smtClean="0"/>
-              <a:t>transport </a:t>
-            </a:r>
-            <a:r>
-              <a:rPr lang="fr-FR" dirty="0"/>
-              <a:t>feeder</a:t>
-            </a:r>
-            <a:r>
-              <a:rPr lang="fr-FR" dirty="0" smtClean="0"/>
-              <a:t>.</a:t>
-            </a:r>
-          </a:p>
-          <a:p>
-            <a:r>
-              <a:rPr lang="en-US" dirty="0"/>
-              <a:t>Put constraints on pickup stations to be open on </a:t>
-            </a:r>
-            <a:r>
-              <a:rPr lang="en-US" dirty="0" smtClean="0"/>
-              <a:t>specific </a:t>
-            </a:r>
-            <a:r>
-              <a:rPr lang="en-US" dirty="0"/>
-              <a:t>areas </a:t>
-            </a:r>
-            <a:r>
-              <a:rPr lang="en-US" dirty="0" smtClean="0"/>
-              <a:t>where </a:t>
-            </a:r>
-            <a:r>
-              <a:rPr lang="fr-FR" dirty="0" err="1" smtClean="0"/>
-              <a:t>there</a:t>
-            </a:r>
-            <a:r>
-              <a:rPr lang="fr-FR" dirty="0" smtClean="0"/>
-              <a:t> </a:t>
-            </a:r>
-            <a:r>
-              <a:rPr lang="fr-FR" dirty="0"/>
-              <a:t>are no obstacles</a:t>
-            </a:r>
-            <a:r>
-              <a:rPr lang="fr-FR" dirty="0" smtClean="0"/>
-              <a:t>.</a:t>
-            </a:r>
-          </a:p>
-          <a:p>
-            <a:endParaRPr lang="fr-FR" dirty="0"/>
-          </a:p>
-        </p:txBody>
-      </p:sp>
-      <p:sp>
-        <p:nvSpPr>
-          <p:cNvPr id="4" name="Espace réservé de la date 3"/>
-          <p:cNvSpPr>
-            <a:spLocks noGrp="1"/>
-          </p:cNvSpPr>
-          <p:nvPr>
-            <p:ph type="dt" sz="half" idx="10"/>
-          </p:nvPr>
-        </p:nvSpPr>
-        <p:spPr/>
-        <p:txBody>
-          <a:bodyPr/>
-          <a:lstStyle/>
-          <a:p>
-            <a:fld id="{00BE4C9A-503E-44A1-BB10-CBEF238A28BC}" type="datetime1">
-              <a:rPr lang="fr-FR" smtClean="0"/>
-              <a:t>11/06/2020</a:t>
-            </a:fld>
-            <a:endParaRPr lang="fr-FR"/>
-          </a:p>
-        </p:txBody>
-      </p:sp>
-      <p:sp>
-        <p:nvSpPr>
-          <p:cNvPr id="5" name="Espace réservé du pied de page 4"/>
-          <p:cNvSpPr>
-            <a:spLocks noGrp="1"/>
-          </p:cNvSpPr>
-          <p:nvPr>
-            <p:ph type="ftr" sz="quarter" idx="11"/>
-          </p:nvPr>
-        </p:nvSpPr>
-        <p:spPr/>
-        <p:txBody>
-          <a:bodyPr/>
-          <a:lstStyle/>
-          <a:p>
-            <a:r>
-              <a:rPr lang="en-US" smtClean="0"/>
-              <a:t>Defense - Research Project - Complex Systems Engineering (M1)</a:t>
-            </a:r>
-            <a:endParaRPr lang="fr-FR"/>
-          </a:p>
-        </p:txBody>
-      </p:sp>
-      <p:sp>
-        <p:nvSpPr>
-          <p:cNvPr id="6" name="Espace réservé du numéro de diapositive 5"/>
-          <p:cNvSpPr>
-            <a:spLocks noGrp="1"/>
-          </p:cNvSpPr>
-          <p:nvPr>
-            <p:ph type="sldNum" sz="quarter" idx="12"/>
-          </p:nvPr>
-        </p:nvSpPr>
-        <p:spPr/>
-        <p:txBody>
-          <a:bodyPr/>
-          <a:lstStyle/>
-          <a:p>
-            <a:fld id="{DA3876A1-FE05-45B1-8F8C-6A5E69C2C81A}" type="slidenum">
-              <a:rPr lang="fr-FR" smtClean="0"/>
-              <a:t>31</a:t>
             </a:fld>
             <a:endParaRPr lang="fr-FR"/>
           </a:p>
@@ -14904,14 +15314,432 @@
   <p:timing>
     <p:tnLst>
       <p:par>
-        <p:cTn id="1" dur="indefinite" restart="never" nodeType="tmRoot"/>
+        <p:cTn id="1" dur="indefinite" restart="never" nodeType="tmRoot">
+          <p:childTnLst>
+            <p:seq concurrent="1" nextAc="seek">
+              <p:cTn id="2" dur="indefinite" nodeType="mainSeq">
+                <p:childTnLst>
+                  <p:par>
+                    <p:cTn id="3" fill="hold">
+                      <p:stCondLst>
+                        <p:cond delay="indefinite"/>
+                      </p:stCondLst>
+                      <p:childTnLst>
+                        <p:par>
+                          <p:cTn id="4" fill="hold">
+                            <p:stCondLst>
+                              <p:cond delay="0"/>
+                            </p:stCondLst>
+                            <p:childTnLst>
+                              <p:par>
+                                <p:cTn id="5" presetID="1" presetClass="entr" presetSubtype="0" fill="hold" grpId="0" nodeType="clickEffect">
+                                  <p:stCondLst>
+                                    <p:cond delay="0"/>
+                                  </p:stCondLst>
+                                  <p:childTnLst>
+                                    <p:set>
+                                      <p:cBhvr>
+                                        <p:cTn id="6" dur="1" fill="hold">
+                                          <p:stCondLst>
+                                            <p:cond delay="0"/>
+                                          </p:stCondLst>
+                                        </p:cTn>
+                                        <p:tgtEl>
+                                          <p:spTgt spid="3">
+                                            <p:txEl>
+                                              <p:pRg st="0" end="0"/>
+                                            </p:txEl>
+                                          </p:spTgt>
+                                        </p:tgtEl>
+                                        <p:attrNameLst>
+                                          <p:attrName>style.visibility</p:attrName>
+                                        </p:attrNameLst>
+                                      </p:cBhvr>
+                                      <p:to>
+                                        <p:strVal val="visible"/>
+                                      </p:to>
+                                    </p:set>
+                                  </p:childTnLst>
+                                </p:cTn>
+                              </p:par>
+                            </p:childTnLst>
+                          </p:cTn>
+                        </p:par>
+                      </p:childTnLst>
+                    </p:cTn>
+                  </p:par>
+                  <p:par>
+                    <p:cTn id="7" fill="hold">
+                      <p:stCondLst>
+                        <p:cond delay="indefinite"/>
+                      </p:stCondLst>
+                      <p:childTnLst>
+                        <p:par>
+                          <p:cTn id="8" fill="hold">
+                            <p:stCondLst>
+                              <p:cond delay="0"/>
+                            </p:stCondLst>
+                            <p:childTnLst>
+                              <p:par>
+                                <p:cTn id="9" presetID="1" presetClass="entr" presetSubtype="0" fill="hold" grpId="0" nodeType="clickEffect">
+                                  <p:stCondLst>
+                                    <p:cond delay="0"/>
+                                  </p:stCondLst>
+                                  <p:childTnLst>
+                                    <p:set>
+                                      <p:cBhvr>
+                                        <p:cTn id="10" dur="1" fill="hold">
+                                          <p:stCondLst>
+                                            <p:cond delay="0"/>
+                                          </p:stCondLst>
+                                        </p:cTn>
+                                        <p:tgtEl>
+                                          <p:spTgt spid="3">
+                                            <p:txEl>
+                                              <p:pRg st="1" end="1"/>
+                                            </p:txEl>
+                                          </p:spTgt>
+                                        </p:tgtEl>
+                                        <p:attrNameLst>
+                                          <p:attrName>style.visibility</p:attrName>
+                                        </p:attrNameLst>
+                                      </p:cBhvr>
+                                      <p:to>
+                                        <p:strVal val="visible"/>
+                                      </p:to>
+                                    </p:set>
+                                  </p:childTnLst>
+                                </p:cTn>
+                              </p:par>
+                            </p:childTnLst>
+                          </p:cTn>
+                        </p:par>
+                      </p:childTnLst>
+                    </p:cTn>
+                  </p:par>
+                  <p:par>
+                    <p:cTn id="11" fill="hold">
+                      <p:stCondLst>
+                        <p:cond delay="indefinite"/>
+                      </p:stCondLst>
+                      <p:childTnLst>
+                        <p:par>
+                          <p:cTn id="12" fill="hold">
+                            <p:stCondLst>
+                              <p:cond delay="0"/>
+                            </p:stCondLst>
+                            <p:childTnLst>
+                              <p:par>
+                                <p:cTn id="13" presetID="1" presetClass="entr" presetSubtype="0" fill="hold" grpId="0" nodeType="clickEffect">
+                                  <p:stCondLst>
+                                    <p:cond delay="0"/>
+                                  </p:stCondLst>
+                                  <p:childTnLst>
+                                    <p:set>
+                                      <p:cBhvr>
+                                        <p:cTn id="14" dur="1" fill="hold">
+                                          <p:stCondLst>
+                                            <p:cond delay="0"/>
+                                          </p:stCondLst>
+                                        </p:cTn>
+                                        <p:tgtEl>
+                                          <p:spTgt spid="3">
+                                            <p:txEl>
+                                              <p:pRg st="2" end="2"/>
+                                            </p:txEl>
+                                          </p:spTgt>
+                                        </p:tgtEl>
+                                        <p:attrNameLst>
+                                          <p:attrName>style.visibility</p:attrName>
+                                        </p:attrNameLst>
+                                      </p:cBhvr>
+                                      <p:to>
+                                        <p:strVal val="visible"/>
+                                      </p:to>
+                                    </p:set>
+                                  </p:childTnLst>
+                                </p:cTn>
+                              </p:par>
+                            </p:childTnLst>
+                          </p:cTn>
+                        </p:par>
+                      </p:childTnLst>
+                    </p:cTn>
+                  </p:par>
+                  <p:par>
+                    <p:cTn id="15" fill="hold">
+                      <p:stCondLst>
+                        <p:cond delay="indefinite"/>
+                      </p:stCondLst>
+                      <p:childTnLst>
+                        <p:par>
+                          <p:cTn id="16" fill="hold">
+                            <p:stCondLst>
+                              <p:cond delay="0"/>
+                            </p:stCondLst>
+                            <p:childTnLst>
+                              <p:par>
+                                <p:cTn id="17" presetID="1" presetClass="entr" presetSubtype="0" fill="hold" grpId="0" nodeType="clickEffect">
+                                  <p:stCondLst>
+                                    <p:cond delay="0"/>
+                                  </p:stCondLst>
+                                  <p:childTnLst>
+                                    <p:set>
+                                      <p:cBhvr>
+                                        <p:cTn id="18" dur="1" fill="hold">
+                                          <p:stCondLst>
+                                            <p:cond delay="0"/>
+                                          </p:stCondLst>
+                                        </p:cTn>
+                                        <p:tgtEl>
+                                          <p:spTgt spid="3">
+                                            <p:txEl>
+                                              <p:pRg st="3" end="3"/>
+                                            </p:txEl>
+                                          </p:spTgt>
+                                        </p:tgtEl>
+                                        <p:attrNameLst>
+                                          <p:attrName>style.visibility</p:attrName>
+                                        </p:attrNameLst>
+                                      </p:cBhvr>
+                                      <p:to>
+                                        <p:strVal val="visible"/>
+                                      </p:to>
+                                    </p:set>
+                                  </p:childTnLst>
+                                </p:cTn>
+                              </p:par>
+                            </p:childTnLst>
+                          </p:cTn>
+                        </p:par>
+                      </p:childTnLst>
+                    </p:cTn>
+                  </p:par>
+                  <p:par>
+                    <p:cTn id="19" fill="hold">
+                      <p:stCondLst>
+                        <p:cond delay="indefinite"/>
+                      </p:stCondLst>
+                      <p:childTnLst>
+                        <p:par>
+                          <p:cTn id="20" fill="hold">
+                            <p:stCondLst>
+                              <p:cond delay="0"/>
+                            </p:stCondLst>
+                            <p:childTnLst>
+                              <p:par>
+                                <p:cTn id="21" presetID="1" presetClass="entr" presetSubtype="0" fill="hold" grpId="0" nodeType="clickEffect">
+                                  <p:stCondLst>
+                                    <p:cond delay="0"/>
+                                  </p:stCondLst>
+                                  <p:childTnLst>
+                                    <p:set>
+                                      <p:cBhvr>
+                                        <p:cTn id="22" dur="1" fill="hold">
+                                          <p:stCondLst>
+                                            <p:cond delay="0"/>
+                                          </p:stCondLst>
+                                        </p:cTn>
+                                        <p:tgtEl>
+                                          <p:spTgt spid="3">
+                                            <p:txEl>
+                                              <p:pRg st="4" end="4"/>
+                                            </p:txEl>
+                                          </p:spTgt>
+                                        </p:tgtEl>
+                                        <p:attrNameLst>
+                                          <p:attrName>style.visibility</p:attrName>
+                                        </p:attrNameLst>
+                                      </p:cBhvr>
+                                      <p:to>
+                                        <p:strVal val="visible"/>
+                                      </p:to>
+                                    </p:set>
+                                  </p:childTnLst>
+                                </p:cTn>
+                              </p:par>
+                            </p:childTnLst>
+                          </p:cTn>
+                        </p:par>
+                      </p:childTnLst>
+                    </p:cTn>
+                  </p:par>
+                  <p:par>
+                    <p:cTn id="23" fill="hold">
+                      <p:stCondLst>
+                        <p:cond delay="indefinite"/>
+                      </p:stCondLst>
+                      <p:childTnLst>
+                        <p:par>
+                          <p:cTn id="24" fill="hold">
+                            <p:stCondLst>
+                              <p:cond delay="0"/>
+                            </p:stCondLst>
+                            <p:childTnLst>
+                              <p:par>
+                                <p:cTn id="25" presetID="1" presetClass="entr" presetSubtype="0" fill="hold" grpId="0" nodeType="clickEffect">
+                                  <p:stCondLst>
+                                    <p:cond delay="0"/>
+                                  </p:stCondLst>
+                                  <p:childTnLst>
+                                    <p:set>
+                                      <p:cBhvr>
+                                        <p:cTn id="26" dur="1" fill="hold">
+                                          <p:stCondLst>
+                                            <p:cond delay="0"/>
+                                          </p:stCondLst>
+                                        </p:cTn>
+                                        <p:tgtEl>
+                                          <p:spTgt spid="3">
+                                            <p:txEl>
+                                              <p:pRg st="5" end="5"/>
+                                            </p:txEl>
+                                          </p:spTgt>
+                                        </p:tgtEl>
+                                        <p:attrNameLst>
+                                          <p:attrName>style.visibility</p:attrName>
+                                        </p:attrNameLst>
+                                      </p:cBhvr>
+                                      <p:to>
+                                        <p:strVal val="visible"/>
+                                      </p:to>
+                                    </p:set>
+                                  </p:childTnLst>
+                                </p:cTn>
+                              </p:par>
+                            </p:childTnLst>
+                          </p:cTn>
+                        </p:par>
+                      </p:childTnLst>
+                    </p:cTn>
+                  </p:par>
+                  <p:par>
+                    <p:cTn id="27" fill="hold">
+                      <p:stCondLst>
+                        <p:cond delay="indefinite"/>
+                      </p:stCondLst>
+                      <p:childTnLst>
+                        <p:par>
+                          <p:cTn id="28" fill="hold">
+                            <p:stCondLst>
+                              <p:cond delay="0"/>
+                            </p:stCondLst>
+                            <p:childTnLst>
+                              <p:par>
+                                <p:cTn id="29" presetID="1" presetClass="entr" presetSubtype="0" fill="hold" grpId="0" nodeType="clickEffect">
+                                  <p:stCondLst>
+                                    <p:cond delay="0"/>
+                                  </p:stCondLst>
+                                  <p:childTnLst>
+                                    <p:set>
+                                      <p:cBhvr>
+                                        <p:cTn id="30" dur="1" fill="hold">
+                                          <p:stCondLst>
+                                            <p:cond delay="0"/>
+                                          </p:stCondLst>
+                                        </p:cTn>
+                                        <p:tgtEl>
+                                          <p:spTgt spid="3">
+                                            <p:txEl>
+                                              <p:pRg st="6" end="6"/>
+                                            </p:txEl>
+                                          </p:spTgt>
+                                        </p:tgtEl>
+                                        <p:attrNameLst>
+                                          <p:attrName>style.visibility</p:attrName>
+                                        </p:attrNameLst>
+                                      </p:cBhvr>
+                                      <p:to>
+                                        <p:strVal val="visible"/>
+                                      </p:to>
+                                    </p:set>
+                                  </p:childTnLst>
+                                </p:cTn>
+                              </p:par>
+                            </p:childTnLst>
+                          </p:cTn>
+                        </p:par>
+                      </p:childTnLst>
+                    </p:cTn>
+                  </p:par>
+                  <p:par>
+                    <p:cTn id="31" fill="hold">
+                      <p:stCondLst>
+                        <p:cond delay="indefinite"/>
+                      </p:stCondLst>
+                      <p:childTnLst>
+                        <p:par>
+                          <p:cTn id="32" fill="hold">
+                            <p:stCondLst>
+                              <p:cond delay="0"/>
+                            </p:stCondLst>
+                            <p:childTnLst>
+                              <p:par>
+                                <p:cTn id="33" presetID="1" presetClass="entr" presetSubtype="0" fill="hold" grpId="0" nodeType="clickEffect">
+                                  <p:stCondLst>
+                                    <p:cond delay="0"/>
+                                  </p:stCondLst>
+                                  <p:childTnLst>
+                                    <p:set>
+                                      <p:cBhvr>
+                                        <p:cTn id="34" dur="1" fill="hold">
+                                          <p:stCondLst>
+                                            <p:cond delay="0"/>
+                                          </p:stCondLst>
+                                        </p:cTn>
+                                        <p:tgtEl>
+                                          <p:spTgt spid="3">
+                                            <p:txEl>
+                                              <p:pRg st="7" end="7"/>
+                                            </p:txEl>
+                                          </p:spTgt>
+                                        </p:tgtEl>
+                                        <p:attrNameLst>
+                                          <p:attrName>style.visibility</p:attrName>
+                                        </p:attrNameLst>
+                                      </p:cBhvr>
+                                      <p:to>
+                                        <p:strVal val="visible"/>
+                                      </p:to>
+                                    </p:set>
+                                  </p:childTnLst>
+                                </p:cTn>
+                              </p:par>
+                            </p:childTnLst>
+                          </p:cTn>
+                        </p:par>
+                      </p:childTnLst>
+                    </p:cTn>
+                  </p:par>
+                </p:childTnLst>
+              </p:cTn>
+              <p:prevCondLst>
+                <p:cond evt="onPrev" delay="0">
+                  <p:tgtEl>
+                    <p:sldTgt/>
+                  </p:tgtEl>
+                </p:cond>
+              </p:prevCondLst>
+              <p:nextCondLst>
+                <p:cond evt="onNext" delay="0">
+                  <p:tgtEl>
+                    <p:sldTgt/>
+                  </p:tgtEl>
+                </p:cond>
+              </p:nextCondLst>
+            </p:seq>
+          </p:childTnLst>
+        </p:cTn>
       </p:par>
     </p:tnLst>
+    <p:bldLst>
+      <p:bldP spid="3" grpId="0" build="p"/>
+    </p:bldLst>
   </p:timing>
 </p:sld>
 </file>
 
-<file path=ppt/slides/slide32.xml><?xml version="1.0" encoding="utf-8"?>
+<file path=ppt/slides/slide31.xml><?xml version="1.0" encoding="utf-8"?>
 <p:sld xmlns:a="http://schemas.openxmlformats.org/drawingml/2006/main" xmlns:r="http://schemas.openxmlformats.org/officeDocument/2006/relationships" xmlns:p="http://schemas.openxmlformats.org/presentationml/2006/main">
   <p:cSld>
     <p:spTree>
@@ -14949,22 +15777,22 @@
           <a:lstStyle/>
           <a:p>
             <a:r>
-              <a:rPr lang="fr-FR" dirty="0"/>
+              <a:rPr lang="fr-FR" b="1" dirty="0"/>
               <a:t>A</a:t>
             </a:r>
             <a:r>
-              <a:rPr lang="fr-FR" dirty="0" smtClean="0"/>
+              <a:rPr lang="fr-FR" b="1" dirty="0" smtClean="0"/>
               <a:t>ccess to the </a:t>
             </a:r>
             <a:r>
-              <a:rPr lang="fr-FR" dirty="0" err="1" smtClean="0"/>
+              <a:rPr lang="fr-FR" b="1" dirty="0" err="1" smtClean="0"/>
               <a:t>project</a:t>
             </a:r>
             <a:r>
-              <a:rPr lang="fr-FR" dirty="0" smtClean="0"/>
+              <a:rPr lang="fr-FR" b="1" dirty="0" smtClean="0"/>
               <a:t>:</a:t>
             </a:r>
-            <a:endParaRPr lang="fr-FR" dirty="0"/>
+            <a:endParaRPr lang="fr-FR" b="1" dirty="0"/>
           </a:p>
         </p:txBody>
       </p:sp>
@@ -14985,7 +15813,7 @@
           <a:p>
             <a:fld id="{5341FF9D-3E5A-408B-A043-E023B5C7D440}" type="datetime1">
               <a:rPr lang="fr-FR" smtClean="0"/>
-              <a:t>11/06/2020</a:t>
+              <a:t>12/06/2020</a:t>
             </a:fld>
             <a:endParaRPr lang="fr-FR"/>
           </a:p>
@@ -15031,7 +15859,7 @@
           <a:p>
             <a:fld id="{DA3876A1-FE05-45B1-8F8C-6A5E69C2C81A}" type="slidenum">
               <a:rPr lang="fr-FR" smtClean="0"/>
-              <a:t>32</a:t>
+              <a:t>31</a:t>
             </a:fld>
             <a:endParaRPr lang="fr-FR"/>
           </a:p>
@@ -15301,7 +16129,7 @@
 </p:sld>
 </file>
 
-<file path=ppt/slides/slide33.xml><?xml version="1.0" encoding="utf-8"?>
+<file path=ppt/slides/slide32.xml><?xml version="1.0" encoding="utf-8"?>
 <p:sld xmlns:a="http://schemas.openxmlformats.org/drawingml/2006/main" xmlns:r="http://schemas.openxmlformats.org/officeDocument/2006/relationships" xmlns:p="http://schemas.openxmlformats.org/presentationml/2006/main">
   <p:cSld>
     <p:spTree>
@@ -15335,7 +16163,7 @@
           <a:p>
             <a:fld id="{A32D6B03-9A94-4FB9-9F41-CAF70BD85126}" type="datetime1">
               <a:rPr lang="fr-FR" smtClean="0"/>
-              <a:t>11/06/2020</a:t>
+              <a:t>12/06/2020</a:t>
             </a:fld>
             <a:endParaRPr lang="fr-FR"/>
           </a:p>
@@ -15381,7 +16209,7 @@
           <a:p>
             <a:fld id="{DA3876A1-FE05-45B1-8F8C-6A5E69C2C81A}" type="slidenum">
               <a:rPr lang="fr-FR" smtClean="0"/>
-              <a:t>33</a:t>
+              <a:t>32</a:t>
             </a:fld>
             <a:endParaRPr lang="fr-FR"/>
           </a:p>
@@ -15554,11 +16382,7 @@
           <a:p>
             <a:r>
               <a:rPr lang="fr-FR" b="1" dirty="0" smtClean="0"/>
-              <a:t>Key </a:t>
-            </a:r>
-            <a:r>
-              <a:rPr lang="fr-FR" b="1" dirty="0" smtClean="0"/>
-              <a:t>figures &amp; </a:t>
+              <a:t>Key figures &amp; </a:t>
             </a:r>
             <a:r>
               <a:rPr lang="en-US" b="1" dirty="0" smtClean="0"/>
@@ -15608,7 +16432,6 @@
               <a:rPr lang="en-US" dirty="0" smtClean="0"/>
               <a:t>hour. </a:t>
             </a:r>
-            <a:endParaRPr lang="en-US" dirty="0" smtClean="0"/>
           </a:p>
           <a:p>
             <a:r>
@@ -15631,7 +16454,6 @@
               <a:rPr lang="en-US" dirty="0" smtClean="0"/>
               <a:t>Operating companies with a transport feeder model.</a:t>
             </a:r>
-            <a:endParaRPr lang="en-US" dirty="0" smtClean="0"/>
           </a:p>
           <a:p>
             <a:endParaRPr lang="en-US" dirty="0" smtClean="0"/>
@@ -15658,7 +16480,7 @@
           <a:p>
             <a:fld id="{F17915BF-AA20-4B83-BAD9-5FAEB744B471}" type="datetime1">
               <a:rPr lang="fr-FR" smtClean="0"/>
-              <a:t>11/06/2020</a:t>
+              <a:t>12/06/2020</a:t>
             </a:fld>
             <a:endParaRPr lang="fr-FR"/>
           </a:p>
@@ -16563,11 +17385,7 @@
           <a:p>
             <a:r>
               <a:rPr lang="fr-FR" b="1" dirty="0" smtClean="0"/>
-              <a:t>A point of </a:t>
-            </a:r>
-            <a:r>
-              <a:rPr lang="fr-FR" b="1" dirty="0" smtClean="0"/>
-              <a:t>critique:</a:t>
+              <a:t>A point of critique:</a:t>
             </a:r>
             <a:endParaRPr lang="fr-FR" b="1" dirty="0"/>
           </a:p>
@@ -16615,7 +17433,6 @@
               <a:rPr lang="en-US" dirty="0" smtClean="0"/>
               <a:t>worsening.</a:t>
             </a:r>
-            <a:endParaRPr lang="en-US" dirty="0" smtClean="0"/>
           </a:p>
           <a:p>
             <a:r>
@@ -16765,7 +17582,7 @@
           <a:p>
             <a:fld id="{F17915BF-AA20-4B83-BAD9-5FAEB744B471}" type="datetime1">
               <a:rPr lang="fr-FR" smtClean="0"/>
-              <a:t>11/06/2020</a:t>
+              <a:t>12/06/2020</a:t>
             </a:fld>
             <a:endParaRPr lang="fr-FR"/>
           </a:p>
@@ -17546,7 +18363,7 @@
           <a:p>
             <a:fld id="{76F58B9C-761A-4E45-B672-12ED7357879F}" type="datetime1">
               <a:rPr lang="fr-FR" smtClean="0"/>
-              <a:t>11/06/2020</a:t>
+              <a:t>12/06/2020</a:t>
             </a:fld>
             <a:endParaRPr lang="fr-FR"/>
           </a:p>
@@ -17994,7 +18811,6 @@
               <a:rPr lang="fr-FR" b="1" dirty="0"/>
               <a:t>:</a:t>
             </a:r>
-            <a:endParaRPr lang="fr-FR" b="1" dirty="0"/>
           </a:p>
         </p:txBody>
       </p:sp>
@@ -18068,11 +18884,7 @@
             </a:r>
             <a:r>
               <a:rPr lang="fr-FR" dirty="0" smtClean="0"/>
-              <a:t> and public </a:t>
-            </a:r>
-            <a:r>
-              <a:rPr lang="fr-FR" dirty="0" smtClean="0"/>
-              <a:t>transport</a:t>
+              <a:t> and public transport</a:t>
             </a:r>
             <a:r>
               <a:rPr lang="fr-FR" dirty="0"/>
@@ -18155,13 +18967,8 @@
             </a:r>
             <a:r>
               <a:rPr lang="fr-FR" dirty="0" smtClean="0"/>
-              <a:t> one mode of transportation</a:t>
-            </a:r>
-            <a:r>
-              <a:rPr lang="fr-FR" dirty="0" smtClean="0"/>
-              <a:t>.</a:t>
-            </a:r>
-            <a:endParaRPr lang="fr-FR" dirty="0" smtClean="0"/>
+              <a:t> one mode of transportation.</a:t>
+            </a:r>
           </a:p>
         </p:txBody>
       </p:sp>
@@ -18182,7 +18989,7 @@
           <a:p>
             <a:fld id="{BC728D9A-6E26-4341-BA25-70A4A8D0162C}" type="datetime1">
               <a:rPr lang="fr-FR" smtClean="0"/>
-              <a:t>11/06/2020</a:t>
+              <a:t>12/06/2020</a:t>
             </a:fld>
             <a:endParaRPr lang="fr-FR"/>
           </a:p>
@@ -18712,7 +19519,6 @@
               <a:rPr lang="en-US" dirty="0" smtClean="0"/>
               <a:t>.</a:t>
             </a:r>
-            <a:endParaRPr lang="en-US" dirty="0" smtClean="0"/>
           </a:p>
         </p:txBody>
       </p:sp>
@@ -18733,7 +19539,7 @@
           <a:p>
             <a:fld id="{F17915BF-AA20-4B83-BAD9-5FAEB744B471}" type="datetime1">
               <a:rPr lang="fr-FR" smtClean="0"/>
-              <a:t>11/06/2020</a:t>
+              <a:t>12/06/2020</a:t>
             </a:fld>
             <a:endParaRPr lang="fr-FR"/>
           </a:p>
@@ -19152,7 +19958,7 @@
           <a:p>
             <a:fld id="{F17915BF-AA20-4B83-BAD9-5FAEB744B471}" type="datetime1">
               <a:rPr lang="fr-FR" smtClean="0"/>
-              <a:t>11/06/2020</a:t>
+              <a:t>12/06/2020</a:t>
             </a:fld>
             <a:endParaRPr lang="fr-FR"/>
           </a:p>

</xml_diff>